<commit_message>
Photon Membership Registration Structure Redesigned
- Renewal of how to set a nickname
  when registering as a member

- Implement login success function
  and membership registration
  success function by overloading
  functions

- When leaving the room, enter the
   lobby and set the priority of the
   canvas when connected.

- Each PPT data update

- Deleting and adding resource data
</commit_message>
<xml_diff>
--- a/Photon Server/Assets/PPT Data/Photon PlayFab.pptx
+++ b/Photon Server/Assets/PPT Data/Photon PlayFab.pptx
@@ -2,7 +2,7 @@
 <file path=ppt/presentation.xml><?xml version="1.0" encoding="utf-8"?>
 <p:presentation xmlns:a="http://schemas.openxmlformats.org/drawingml/2006/main" xmlns:r="http://schemas.openxmlformats.org/officeDocument/2006/relationships" xmlns:p="http://schemas.openxmlformats.org/presentationml/2006/main" xmlns:p14="http://schemas.microsoft.com/office/powerpoint/2010/main" saveSubsetFonts="1" firstSlideNum="0">
   <p:sldMasterIdLst>
-    <p:sldMasterId id="2147487046" r:id="rId12"/>
+    <p:sldMasterId id="2147487054" r:id="rId12"/>
   </p:sldMasterIdLst>
   <p:notesMasterIdLst>
     <p:notesMasterId r:id="rId14"/>
@@ -20,13 +20,13 @@
     <p:sldId id="338" r:id="rId34"/>
     <p:sldId id="330" r:id="rId36"/>
     <p:sldId id="339" r:id="rId38"/>
-    <p:sldId id="323" r:id="rId40"/>
-    <p:sldId id="324" r:id="rId42"/>
-    <p:sldId id="340" r:id="rId43"/>
-    <p:sldId id="334" r:id="rId44"/>
-    <p:sldId id="326" r:id="rId45"/>
-    <p:sldId id="335" r:id="rId46"/>
-    <p:sldId id="337" r:id="rId47"/>
+    <p:sldId id="323" r:id="rId39"/>
+    <p:sldId id="324" r:id="rId40"/>
+    <p:sldId id="340" r:id="rId41"/>
+    <p:sldId id="334" r:id="rId42"/>
+    <p:sldId id="326" r:id="rId43"/>
+    <p:sldId id="335" r:id="rId44"/>
+    <p:sldId id="337" r:id="rId46"/>
     <p:sldId id="341" r:id="rId48"/>
   </p:sldIdLst>
   <p:sldSz cx="12192000" cy="6858000"/>
@@ -9804,7 +9804,7 @@
       </p:sp>
       <p:sp>
         <p:nvSpPr>
-          <p:cNvPr id="48" name="Rect 0"/>
+          <p:cNvPr id="61" name="Rect 0"/>
           <p:cNvSpPr txBox="1">
             <a:spLocks/>
           </p:cNvSpPr>
@@ -9812,8 +9812,8 @@
         </p:nvSpPr>
         <p:spPr>
           <a:xfrm rot="0">
-            <a:off x="1230630" y="5261610"/>
-            <a:ext cx="4145915" cy="955040"/>
+            <a:off x="6813550" y="5264785"/>
+            <a:ext cx="4135755" cy="955040"/>
           </a:xfrm>
           <a:prstGeom prst="rect"/>
           <a:noFill/>
@@ -9840,7 +9840,7 @@
                 <a:latin typeface="맑은 고딕" charset="0"/>
                 <a:ea typeface="맑은 고딕" charset="0"/>
               </a:rPr>
-              <a:t>24.</a:t>
+              <a:t>26.</a:t>
             </a:r>
             <a:r>
               <a:rPr lang="ko-KR" sz="2000">
@@ -9857,28 +9857,35 @@
                 <a:latin typeface="맑은 고딕" charset="0"/>
                 <a:ea typeface="맑은 고딕" charset="0"/>
               </a:rPr>
-              <a:t>이제 UI에서 Input Field를 생성한 </a:t>
-            </a:r>
-            <a:r>
-              <a:rPr lang="ko-KR" sz="1800">
-                <a:latin typeface="맑은 고딕" charset="0"/>
-                <a:ea typeface="맑은 고딕" charset="0"/>
-              </a:rPr>
-              <a:t>다음</a:t>
-            </a:r>
-            <a:r>
-              <a:rPr lang="ko-KR" sz="1800">
-                <a:latin typeface="맑은 고딕" charset="0"/>
-                <a:ea typeface="맑은 고딕" charset="0"/>
-              </a:rPr>
-              <a:t> UserName Input이라는 이름으로 </a:t>
-            </a:r>
-            <a:r>
-              <a:rPr lang="ko-KR" sz="1800">
-                <a:latin typeface="맑은 고딕" charset="0"/>
-                <a:ea typeface="맑은 고딕" charset="0"/>
-              </a:rPr>
-              <a:t>정의합니다.</a:t>
+              <a:t>그런 다음 Sign Up Button </a:t>
+            </a:r>
+            <a:r>
+              <a:rPr lang="ko-KR" sz="1800">
+                <a:latin typeface="맑은 고딕" charset="0"/>
+                <a:ea typeface="맑은 고딕" charset="0"/>
+              </a:rPr>
+              <a:t>오브젝트의</a:t>
+            </a:r>
+            <a:r>
+              <a:rPr lang="ko-KR" sz="1800">
+                <a:latin typeface="맑은 고딕" charset="0"/>
+                <a:ea typeface="맑은 고딕" charset="0"/>
+              </a:rPr>
+              <a:t> 앵커를 지정하고 위치와 </a:t>
+            </a:r>
+            <a:r>
+              <a:rPr lang="ko-KR" sz="1800">
+                <a:latin typeface="맑은 고딕" charset="0"/>
+                <a:ea typeface="맑은 고딕" charset="0"/>
+              </a:rPr>
+              <a:t>크기를</a:t>
+            </a:r>
+            <a:r>
+              <a:rPr lang="ko-KR" sz="1800">
+                <a:latin typeface="맑은 고딕" charset="0"/>
+                <a:ea typeface="맑은 고딕" charset="0"/>
+              </a:rPr>
+              <a:t> 설정합니다.</a:t>
             </a:r>
             <a:endParaRPr lang="ko-KR" altLang="en-US" sz="1800">
               <a:latin typeface="맑은 고딕" charset="0"/>
@@ -9887,163 +9894,9 @@
           </a:p>
         </p:txBody>
       </p:sp>
-      <p:sp>
-        <p:nvSpPr>
-          <p:cNvPr id="61" name="Rect 0"/>
-          <p:cNvSpPr txBox="1">
-            <a:spLocks/>
-          </p:cNvSpPr>
-          <p:nvPr/>
-        </p:nvSpPr>
-        <p:spPr>
-          <a:xfrm rot="0">
-            <a:off x="6813550" y="5264785"/>
-            <a:ext cx="4135755" cy="955040"/>
-          </a:xfrm>
-          <a:prstGeom prst="rect"/>
-          <a:noFill/>
-          <a:ln w="0">
-            <a:noFill/>
-            <a:prstDash/>
-          </a:ln>
-        </p:spPr>
-        <p:txBody>
-          <a:bodyPr wrap="square" lIns="89535" tIns="46355" rIns="89535" bIns="46355" numCol="1" vert="horz" anchor="t">
-            <a:spAutoFit/>
-          </a:bodyPr>
-          <a:lstStyle/>
-          <a:p>
-            <a:pPr marL="0" indent="0" rtl="0" algn="l" defTabSz="914400" eaLnBrk="1" latinLnBrk="0" hangingPunct="1">
-              <a:buFontTx/>
-              <a:buNone/>
-            </a:pPr>
-            <a:r>
-              <a:rPr lang="ko-KR" sz="2000" b="1">
-                <a:solidFill>
-                  <a:srgbClr val="0611F2"/>
-                </a:solidFill>
-                <a:latin typeface="맑은 고딕" charset="0"/>
-                <a:ea typeface="맑은 고딕" charset="0"/>
-              </a:rPr>
-              <a:t>26.</a:t>
-            </a:r>
-            <a:r>
-              <a:rPr lang="ko-KR" sz="2000">
-                <a:solidFill>
-                  <a:srgbClr val="0611F2"/>
-                </a:solidFill>
-                <a:latin typeface="맑은 고딕" charset="0"/>
-                <a:ea typeface="맑은 고딕" charset="0"/>
-              </a:rPr>
-              <a:t> </a:t>
-            </a:r>
-            <a:r>
-              <a:rPr lang="ko-KR" sz="1800">
-                <a:latin typeface="맑은 고딕" charset="0"/>
-                <a:ea typeface="맑은 고딕" charset="0"/>
-              </a:rPr>
-              <a:t>그런 다음 Sign Up Button </a:t>
-            </a:r>
-            <a:r>
-              <a:rPr lang="ko-KR" sz="1800">
-                <a:latin typeface="맑은 고딕" charset="0"/>
-                <a:ea typeface="맑은 고딕" charset="0"/>
-              </a:rPr>
-              <a:t>오브젝트의</a:t>
-            </a:r>
-            <a:r>
-              <a:rPr lang="ko-KR" sz="1800">
-                <a:latin typeface="맑은 고딕" charset="0"/>
-                <a:ea typeface="맑은 고딕" charset="0"/>
-              </a:rPr>
-              <a:t> 앵커를 지정하고 위치와 </a:t>
-            </a:r>
-            <a:r>
-              <a:rPr lang="ko-KR" sz="1800">
-                <a:latin typeface="맑은 고딕" charset="0"/>
-                <a:ea typeface="맑은 고딕" charset="0"/>
-              </a:rPr>
-              <a:t>크기를</a:t>
-            </a:r>
-            <a:r>
-              <a:rPr lang="ko-KR" sz="1800">
-                <a:latin typeface="맑은 고딕" charset="0"/>
-                <a:ea typeface="맑은 고딕" charset="0"/>
-              </a:rPr>
-              <a:t> 설정합니다.</a:t>
-            </a:r>
-            <a:endParaRPr lang="ko-KR" altLang="en-US" sz="1800">
-              <a:latin typeface="맑은 고딕" charset="0"/>
-              <a:ea typeface="맑은 고딕" charset="0"/>
-            </a:endParaRPr>
-          </a:p>
-        </p:txBody>
-      </p:sp>
       <p:pic>
         <p:nvPicPr>
-          <p:cNvPr id="64" name="Picture " descr="C:/Users/Admin1/AppData/Roaming/PolarisOffice/ETemp/11152_12319248/fImage2478525141.png"/>
-          <p:cNvPicPr>
-            <a:picLocks noChangeAspect="1"/>
-          </p:cNvPicPr>
-          <p:nvPr/>
-        </p:nvPicPr>
-        <p:blipFill rotWithShape="1">
-          <a:blip r:embed="rId2" cstate="hqprint">
-            <a:extLst>
-              <a:ext uri="{28A0092B-C50C-407E-A947-70E740481C1C}">
-                <a14:useLocalDpi xmlns:a14="http://schemas.microsoft.com/office/drawing/2010/main"/>
-              </a:ext>
-            </a:extLst>
-          </a:blip>
-          <a:stretch>
-            <a:fillRect/>
-          </a:stretch>
-        </p:blipFill>
-        <p:spPr>
-          <a:xfrm rot="0">
-            <a:off x="1228090" y="1438275"/>
-            <a:ext cx="2779395" cy="3610610"/>
-          </a:xfrm>
-          <a:prstGeom prst="roundRect"/>
-          <a:solidFill>
-            <a:srgbClr val="EDEDED"/>
-          </a:solidFill>
-        </p:spPr>
-      </p:pic>
-      <p:pic>
-        <p:nvPicPr>
-          <p:cNvPr id="68" name="그림 1" descr="C:/Users/Admin1/AppData/Roaming/PolarisOffice/ETemp/11152_12319248/fImage808635541.png"/>
-          <p:cNvPicPr>
-            <a:picLocks noChangeAspect="1"/>
-          </p:cNvPicPr>
-          <p:nvPr/>
-        </p:nvPicPr>
-        <p:blipFill rotWithShape="1">
-          <a:blip r:embed="rId3" cstate="hqprint">
-            <a:extLst>
-              <a:ext uri="{28A0092B-C50C-407E-A947-70E740481C1C}">
-                <a14:useLocalDpi xmlns:a14="http://schemas.microsoft.com/office/drawing/2010/main"/>
-              </a:ext>
-            </a:extLst>
-          </a:blip>
-          <a:stretch>
-            <a:fillRect/>
-          </a:stretch>
-        </p:blipFill>
-        <p:spPr>
-          <a:xfrm rot="0">
-            <a:off x="4139565" y="2265680"/>
-            <a:ext cx="1236980" cy="1947545"/>
-          </a:xfrm>
-          <a:prstGeom prst="roundRect"/>
-          <a:solidFill>
-            <a:srgbClr val="EDEDED"/>
-          </a:solidFill>
-        </p:spPr>
-      </p:pic>
-      <p:pic>
-        <p:nvPicPr>
-          <p:cNvPr id="69" name="그림 7" descr="C:/Users/Admin1/AppData/Roaming/PolarisOffice/ETemp/11152_12319248/fImage122093578467.png"/>
+          <p:cNvPr id="69" name="그림 7"/>
           <p:cNvPicPr>
             <a:picLocks noChangeAspect="1"/>
           </p:cNvPicPr>
@@ -10074,7 +9927,7 @@
       </p:pic>
       <p:pic>
         <p:nvPicPr>
-          <p:cNvPr id="70" name="그림 10" descr="C:/Users/Admin1/AppData/Roaming/PolarisOffice/ETemp/11152_12319248/fImage120093586334.png"/>
+          <p:cNvPr id="70" name="그림 10"/>
           <p:cNvPicPr>
             <a:picLocks noChangeAspect="1"/>
           </p:cNvPicPr>
@@ -10216,6 +10069,166 @@
           </a:p>
         </p:txBody>
       </p:sp>
+      <p:sp>
+        <p:nvSpPr>
+          <p:cNvPr id="72" name="텍스트 상자 4"/>
+          <p:cNvSpPr txBox="1">
+            <a:spLocks/>
+          </p:cNvSpPr>
+          <p:nvPr/>
+        </p:nvSpPr>
+        <p:spPr>
+          <a:xfrm rot="0">
+            <a:off x="1238250" y="5197475"/>
+            <a:ext cx="4039235" cy="954405"/>
+          </a:xfrm>
+          <a:prstGeom prst="rect"/>
+          <a:noFill/>
+          <a:ln w="0">
+            <a:noFill/>
+            <a:prstDash/>
+          </a:ln>
+        </p:spPr>
+        <p:txBody>
+          <a:bodyPr wrap="square" lIns="89535" tIns="46355" rIns="89535" bIns="46355" numCol="1" vert="horz" anchor="t">
+            <a:spAutoFit/>
+          </a:bodyPr>
+          <a:lstStyle/>
+          <a:p>
+            <a:pPr marL="0" indent="0" rtl="0" algn="l" defTabSz="914400" eaLnBrk="1" latinLnBrk="0" hangingPunct="1">
+              <a:buFontTx/>
+              <a:buNone/>
+            </a:pPr>
+            <a:r>
+              <a:rPr lang="ko-KR" sz="2000" b="1">
+                <a:solidFill>
+                  <a:srgbClr val="0611F2"/>
+                </a:solidFill>
+                <a:latin typeface="맑은 고딕" charset="0"/>
+                <a:ea typeface="맑은 고딕" charset="0"/>
+              </a:rPr>
+              <a:t>2</a:t>
+            </a:r>
+            <a:r>
+              <a:rPr lang="ko-KR" sz="2000" b="1">
+                <a:solidFill>
+                  <a:srgbClr val="0611F2"/>
+                </a:solidFill>
+                <a:latin typeface="맑은 고딕" charset="0"/>
+                <a:ea typeface="맑은 고딕" charset="0"/>
+              </a:rPr>
+              <a:t>4</a:t>
+            </a:r>
+            <a:r>
+              <a:rPr lang="ko-KR" sz="2000" b="1">
+                <a:solidFill>
+                  <a:srgbClr val="0611F2"/>
+                </a:solidFill>
+                <a:latin typeface="맑은 고딕" charset="0"/>
+                <a:ea typeface="맑은 고딕" charset="0"/>
+              </a:rPr>
+              <a:t>.</a:t>
+            </a:r>
+            <a:r>
+              <a:rPr lang="ko-KR" sz="2000">
+                <a:solidFill>
+                  <a:srgbClr val="0611F2"/>
+                </a:solidFill>
+                <a:latin typeface="맑은 고딕" charset="0"/>
+                <a:ea typeface="맑은 고딕" charset="0"/>
+              </a:rPr>
+              <a:t> </a:t>
+            </a:r>
+            <a:r>
+              <a:rPr lang="ko-KR" sz="1800">
+                <a:latin typeface="맑은 고딕" charset="0"/>
+                <a:ea typeface="맑은 고딕" charset="0"/>
+              </a:rPr>
+              <a:t>이제</a:t>
+            </a:r>
+            <a:r>
+              <a:rPr lang="ko-KR" sz="1800">
+                <a:latin typeface="맑은 고딕" charset="0"/>
+                <a:ea typeface="맑은 고딕" charset="0"/>
+              </a:rPr>
+              <a:t> Password Input 오브젝트를 선택</a:t>
+            </a:r>
+            <a:r>
+              <a:rPr lang="ko-KR" sz="1800">
+                <a:latin typeface="맑은 고딕" charset="0"/>
+                <a:ea typeface="맑은 고딕" charset="0"/>
+              </a:rPr>
+              <a:t>한 </a:t>
+            </a:r>
+            <a:r>
+              <a:rPr lang="ko-KR" sz="1800">
+                <a:latin typeface="맑은 고딕" charset="0"/>
+                <a:ea typeface="맑은 고딕" charset="0"/>
+              </a:rPr>
+              <a:t>다음</a:t>
+            </a:r>
+            <a:r>
+              <a:rPr lang="ko-KR" sz="1800">
+                <a:latin typeface="맑은 고딕" charset="0"/>
+                <a:ea typeface="맑은 고딕" charset="0"/>
+              </a:rPr>
+              <a:t> Content Type을 </a:t>
+            </a:r>
+            <a:r>
+              <a:rPr lang="ko-KR" sz="1800">
+                <a:solidFill>
+                  <a:srgbClr val="009900"/>
+                </a:solidFill>
+                <a:latin typeface="맑은 고딕" charset="0"/>
+                <a:ea typeface="맑은 고딕" charset="0"/>
+              </a:rPr>
+              <a:t>[Password]</a:t>
+            </a:r>
+            <a:r>
+              <a:rPr lang="ko-KR" sz="1800">
+                <a:latin typeface="맑은 고딕" charset="0"/>
+                <a:ea typeface="맑은 고딕" charset="0"/>
+              </a:rPr>
+              <a:t>로 설정합니다. </a:t>
+            </a:r>
+            <a:endParaRPr lang="ko-KR" altLang="en-US" sz="1800">
+              <a:latin typeface="맑은 고딕" charset="0"/>
+              <a:ea typeface="맑은 고딕" charset="0"/>
+            </a:endParaRPr>
+          </a:p>
+        </p:txBody>
+      </p:sp>
+      <p:pic>
+        <p:nvPicPr>
+          <p:cNvPr id="73" name="그림 5" descr="C:/Users/nwond/AppData/Roaming/PolarisOffice/ETemp/19028_11857112/fImage241662822391.png"/>
+          <p:cNvPicPr>
+            <a:picLocks noChangeAspect="1"/>
+          </p:cNvPicPr>
+          <p:nvPr/>
+        </p:nvPicPr>
+        <p:blipFill rotWithShape="1">
+          <a:blip r:embed="rId7" cstate="hqprint">
+            <a:extLst>
+              <a:ext uri="{28A0092B-C50C-407E-A947-70E740481C1C}">
+                <a14:useLocalDpi xmlns:a14="http://schemas.microsoft.com/office/drawing/2010/main"/>
+              </a:ext>
+            </a:extLst>
+          </a:blip>
+          <a:stretch>
+            <a:fillRect/>
+          </a:stretch>
+        </p:blipFill>
+        <p:spPr>
+          <a:xfrm rot="0">
+            <a:off x="1229360" y="1438275"/>
+            <a:ext cx="4126865" cy="3602355"/>
+          </a:xfrm>
+          <a:prstGeom prst="roundRect"/>
+          <a:solidFill>
+            <a:srgbClr val="EDEDED"/>
+          </a:solidFill>
+        </p:spPr>
+      </p:pic>
     </p:spTree>
   </p:cSld>
   <p:clrMapOvr>
@@ -10353,16 +10366,16 @@
       </p:sp>
       <p:sp>
         <p:nvSpPr>
-          <p:cNvPr id="48" name="Rect 0"/>
+          <p:cNvPr id="54" name="Rect 0"/>
           <p:cNvSpPr txBox="1">
             <a:spLocks/>
           </p:cNvSpPr>
           <p:nvPr/>
         </p:nvSpPr>
         <p:spPr>
-          <a:xfrm>
-            <a:off x="1238250" y="5197475"/>
-            <a:ext cx="4038600" cy="954405"/>
+          <a:xfrm rot="0">
+            <a:off x="6839585" y="5222875"/>
+            <a:ext cx="4109720" cy="954405"/>
           </a:xfrm>
           <a:prstGeom prst="rect"/>
           <a:noFill/>
@@ -10389,7 +10402,7 @@
                 <a:latin typeface="맑은 고딕" charset="0"/>
                 <a:ea typeface="맑은 고딕" charset="0"/>
               </a:rPr>
-              <a:t>27.</a:t>
+              <a:t>28.</a:t>
             </a:r>
             <a:r>
               <a:rPr lang="ko-KR" sz="2000">
@@ -10406,73 +10419,28 @@
                 <a:latin typeface="맑은 고딕" charset="0"/>
                 <a:ea typeface="맑은 고딕" charset="0"/>
               </a:rPr>
-              <a:t>그다음 Password Input </a:t>
-            </a:r>
-            <a:r>
-              <a:rPr lang="ko-KR" sz="1800">
-                <a:latin typeface="맑은 고딕" charset="0"/>
-                <a:ea typeface="맑은 고딕" charset="0"/>
-              </a:rPr>
-              <a:t>오브젝트를</a:t>
-            </a:r>
-            <a:r>
-              <a:rPr lang="ko-KR" sz="1800">
-                <a:latin typeface="맑은 고딕" charset="0"/>
-                <a:ea typeface="맑은 고딕" charset="0"/>
-              </a:rPr>
-              <a:t> </a:t>
-            </a:r>
-            <a:r>
-              <a:rPr lang="ko-KR" sz="1800">
-                <a:latin typeface="맑은 고딕" charset="0"/>
-                <a:ea typeface="맑은 고딕" charset="0"/>
-              </a:rPr>
-              <a:t>선택하고</a:t>
-            </a:r>
-            <a:r>
-              <a:rPr lang="ko-KR" sz="1800">
-                <a:latin typeface="맑은 고딕" charset="0"/>
-                <a:ea typeface="맑은 고딕" charset="0"/>
-              </a:rPr>
-              <a:t> Content Type을 </a:t>
-            </a:r>
-            <a:r>
-              <a:rPr lang="ko-KR" sz="1800">
-                <a:solidFill>
-                  <a:srgbClr val="009900"/>
-                </a:solidFill>
-                <a:latin typeface="맑은 고딕" charset="0"/>
-                <a:ea typeface="맑은 고딕" charset="0"/>
-              </a:rPr>
-              <a:t>[Password]</a:t>
-            </a:r>
-            <a:r>
-              <a:rPr lang="ko-KR" sz="1800">
-                <a:latin typeface="맑은 고딕" charset="0"/>
-                <a:ea typeface="맑은 고딕" charset="0"/>
-              </a:rPr>
-              <a:t>로</a:t>
-            </a:r>
-            <a:r>
-              <a:rPr lang="ko-KR" sz="1800">
-                <a:latin typeface="맑은 고딕" charset="0"/>
-                <a:ea typeface="맑은 고딕" charset="0"/>
-              </a:rPr>
-              <a:t> </a:t>
-            </a:r>
-            <a:r>
-              <a:rPr lang="ko-KR" sz="1800">
-                <a:latin typeface="맑은 고딕" charset="0"/>
-                <a:ea typeface="맑은 고딕" charset="0"/>
-              </a:rPr>
-              <a:t>설정합니다.</a:t>
-            </a:r>
-            <a:r>
-              <a:rPr lang="ko-KR" sz="1800">
-                <a:latin typeface="맑은 고딕" charset="0"/>
-                <a:ea typeface="맑은 고딕" charset="0"/>
-              </a:rPr>
-              <a:t> </a:t>
+              <a:t>그러고 나서 빈 게임 오브젝트 생성한 다음 </a:t>
+            </a:r>
+            <a:r>
+              <a:rPr lang="ko-KR" sz="1800">
+                <a:latin typeface="맑은 고딕" charset="0"/>
+                <a:ea typeface="맑은 고딕" charset="0"/>
+              </a:rPr>
+              <a:t>P</a:t>
+            </a:r>
+            <a:r>
+              <a:rPr lang="ko-KR" sz="1800">
+                <a:latin typeface="맑은 고딕" charset="0"/>
+                <a:ea typeface="맑은 고딕" charset="0"/>
+              </a:rPr>
+              <a:t>layfab Manager</a:t>
+            </a:r>
+            <a:r>
+              <a:rPr lang="ko-KR" sz="1800">
+                <a:latin typeface="맑은 고딕" charset="0"/>
+                <a:ea typeface="맑은 고딕" charset="0"/>
+              </a:rPr>
+              <a:t>라는 이름으로 설정합니다.</a:t>
             </a:r>
             <a:endParaRPr lang="ko-KR" altLang="en-US" sz="1800">
               <a:latin typeface="맑은 고딕" charset="0"/>
@@ -10481,243 +10449,9 @@
           </a:p>
         </p:txBody>
       </p:sp>
-      <p:sp>
-        <p:nvSpPr>
-          <p:cNvPr id="54" name="Rect 0"/>
-          <p:cNvSpPr txBox="1">
-            <a:spLocks/>
-          </p:cNvSpPr>
-          <p:nvPr/>
-        </p:nvSpPr>
-        <p:spPr>
-          <a:xfrm rot="0">
-            <a:off x="6839585" y="4093210"/>
-            <a:ext cx="4109085" cy="2061845"/>
-          </a:xfrm>
-          <a:prstGeom prst="rect"/>
-          <a:noFill/>
-          <a:ln w="0">
-            <a:noFill/>
-            <a:prstDash/>
-          </a:ln>
-        </p:spPr>
-        <p:txBody>
-          <a:bodyPr wrap="square" lIns="89535" tIns="46355" rIns="89535" bIns="46355" numCol="1" vert="horz" anchor="t">
-            <a:spAutoFit/>
-          </a:bodyPr>
-          <a:lstStyle/>
-          <a:p>
-            <a:pPr marL="0" indent="0" rtl="0" algn="l" defTabSz="914400" eaLnBrk="1" latinLnBrk="0" hangingPunct="1">
-              <a:buFontTx/>
-              <a:buNone/>
-            </a:pPr>
-            <a:r>
-              <a:rPr lang="ko-KR" sz="2000" b="1">
-                <a:solidFill>
-                  <a:srgbClr val="0611F2"/>
-                </a:solidFill>
-                <a:latin typeface="맑은 고딕" charset="0"/>
-                <a:ea typeface="맑은 고딕" charset="0"/>
-              </a:rPr>
-              <a:t>28.</a:t>
-            </a:r>
-            <a:r>
-              <a:rPr lang="ko-KR" sz="2000">
-                <a:solidFill>
-                  <a:srgbClr val="0611F2"/>
-                </a:solidFill>
-                <a:latin typeface="맑은 고딕" charset="0"/>
-                <a:ea typeface="맑은 고딕" charset="0"/>
-              </a:rPr>
-              <a:t> </a:t>
-            </a:r>
-            <a:r>
-              <a:rPr lang="ko-KR" sz="1800">
-                <a:latin typeface="맑은 고딕" charset="0"/>
-                <a:ea typeface="맑은 고딕" charset="0"/>
-              </a:rPr>
-              <a:t>그러고 나서 빈 게임 오브젝트 </a:t>
-            </a:r>
-            <a:r>
-              <a:rPr lang="ko-KR" sz="1800">
-                <a:latin typeface="맑은 고딕" charset="0"/>
-                <a:ea typeface="맑은 고딕" charset="0"/>
-              </a:rPr>
-              <a:t>생성한</a:t>
-            </a:r>
-            <a:r>
-              <a:rPr lang="ko-KR" sz="1800">
-                <a:latin typeface="맑은 고딕" charset="0"/>
-                <a:ea typeface="맑은 고딕" charset="0"/>
-              </a:rPr>
-              <a:t> </a:t>
-            </a:r>
-            <a:r>
-              <a:rPr lang="ko-KR" sz="1800">
-                <a:latin typeface="맑은 고딕" charset="0"/>
-                <a:ea typeface="맑은 고딕" charset="0"/>
-              </a:rPr>
-              <a:t>다음</a:t>
-            </a:r>
-            <a:r>
-              <a:rPr lang="ko-KR" sz="1800">
-                <a:latin typeface="맑은 고딕" charset="0"/>
-                <a:ea typeface="맑은 고딕" charset="0"/>
-              </a:rPr>
-              <a:t> Photon </a:t>
-            </a:r>
-            <a:r>
-              <a:rPr lang="ko-KR" sz="1800">
-                <a:latin typeface="맑은 고딕" charset="0"/>
-                <a:ea typeface="맑은 고딕" charset="0"/>
-              </a:rPr>
-              <a:t>Setting이라는 </a:t>
-            </a:r>
-            <a:r>
-              <a:rPr lang="ko-KR" sz="1800">
-                <a:latin typeface="맑은 고딕" charset="0"/>
-                <a:ea typeface="맑은 고딕" charset="0"/>
-              </a:rPr>
-              <a:t>이름으로</a:t>
-            </a:r>
-            <a:r>
-              <a:rPr lang="ko-KR" sz="1800">
-                <a:latin typeface="맑은 고딕" charset="0"/>
-                <a:ea typeface="맑은 고딕" charset="0"/>
-              </a:rPr>
-              <a:t> </a:t>
-            </a:r>
-            <a:r>
-              <a:rPr lang="ko-KR" sz="1800">
-                <a:latin typeface="맑은 고딕" charset="0"/>
-                <a:ea typeface="맑은 고딕" charset="0"/>
-              </a:rPr>
-              <a:t>설정합니다.</a:t>
-            </a:r>
-            <a:endParaRPr lang="ko-KR" altLang="en-US" sz="1800">
-              <a:latin typeface="맑은 고딕" charset="0"/>
-              <a:ea typeface="맑은 고딕" charset="0"/>
-            </a:endParaRPr>
-          </a:p>
-          <a:p>
-            <a:pPr marL="0" indent="0" rtl="0" algn="l" defTabSz="914400" eaLnBrk="1" latinLnBrk="0" hangingPunct="1">
-              <a:buFontTx/>
-              <a:buNone/>
-            </a:pPr>
-            <a:endParaRPr lang="ko-KR" altLang="en-US" sz="1800">
-              <a:latin typeface="맑은 고딕" charset="0"/>
-              <a:ea typeface="맑은 고딕" charset="0"/>
-            </a:endParaRPr>
-          </a:p>
-          <a:p>
-            <a:pPr marL="0" indent="0" rtl="0" algn="l" defTabSz="914400" eaLnBrk="1" latinLnBrk="0" hangingPunct="1">
-              <a:buFontTx/>
-              <a:buNone/>
-            </a:pPr>
-            <a:r>
-              <a:rPr lang="ko-KR" sz="1800">
-                <a:latin typeface="맑은 고딕" charset="0"/>
-                <a:ea typeface="맑은 고딕" charset="0"/>
-              </a:rPr>
-              <a:t>이제</a:t>
-            </a:r>
-            <a:r>
-              <a:rPr lang="ko-KR" sz="1800">
-                <a:latin typeface="맑은 고딕" charset="0"/>
-                <a:ea typeface="맑은 고딕" charset="0"/>
-              </a:rPr>
-              <a:t> PhotonSetting이라는 </a:t>
-            </a:r>
-            <a:r>
-              <a:rPr lang="ko-KR" sz="1800">
-                <a:latin typeface="맑은 고딕" charset="0"/>
-                <a:ea typeface="맑은 고딕" charset="0"/>
-              </a:rPr>
-              <a:t>스크립트를</a:t>
-            </a:r>
-            <a:r>
-              <a:rPr lang="ko-KR" sz="1800">
-                <a:latin typeface="맑은 고딕" charset="0"/>
-                <a:ea typeface="맑은 고딕" charset="0"/>
-              </a:rPr>
-              <a:t> </a:t>
-            </a:r>
-            <a:r>
-              <a:rPr lang="ko-KR" sz="1800">
-                <a:latin typeface="맑은 고딕" charset="0"/>
-                <a:ea typeface="맑은 고딕" charset="0"/>
-              </a:rPr>
-              <a:t>생성한</a:t>
-            </a:r>
-            <a:r>
-              <a:rPr lang="ko-KR" sz="1800">
-                <a:latin typeface="맑은 고딕" charset="0"/>
-                <a:ea typeface="맑은 고딕" charset="0"/>
-              </a:rPr>
-              <a:t> 다음 Photon Setting </a:t>
-            </a:r>
-            <a:r>
-              <a:rPr lang="ko-KR" sz="1800">
-                <a:latin typeface="맑은 고딕" charset="0"/>
-                <a:ea typeface="맑은 고딕" charset="0"/>
-              </a:rPr>
-              <a:t>오브젝트에</a:t>
-            </a:r>
-            <a:r>
-              <a:rPr lang="ko-KR" sz="1800">
-                <a:latin typeface="맑은 고딕" charset="0"/>
-                <a:ea typeface="맑은 고딕" charset="0"/>
-              </a:rPr>
-              <a:t> </a:t>
-            </a:r>
-            <a:r>
-              <a:rPr lang="ko-KR" sz="1800">
-                <a:latin typeface="맑은 고딕" charset="0"/>
-                <a:ea typeface="맑은 고딕" charset="0"/>
-              </a:rPr>
-              <a:t>넣어줍니다.</a:t>
-            </a:r>
-            <a:endParaRPr lang="ko-KR" altLang="en-US" sz="1800">
-              <a:latin typeface="맑은 고딕" charset="0"/>
-              <a:ea typeface="맑은 고딕" charset="0"/>
-            </a:endParaRPr>
-          </a:p>
-        </p:txBody>
-      </p:sp>
       <p:pic>
         <p:nvPicPr>
-          <p:cNvPr id="59" name="그림 32"/>
-          <p:cNvPicPr>
-            <a:picLocks noChangeAspect="1"/>
-          </p:cNvPicPr>
-          <p:nvPr/>
-        </p:nvPicPr>
-        <p:blipFill rotWithShape="1">
-          <a:blip r:embed="rId2" cstate="hqprint">
-            <a:extLst>
-              <a:ext uri="{28A0092B-C50C-407E-A947-70E740481C1C}">
-                <a14:useLocalDpi xmlns:a14="http://schemas.microsoft.com/office/drawing/2010/main"/>
-              </a:ext>
-            </a:extLst>
-          </a:blip>
-          <a:stretch>
-            <a:fillRect/>
-          </a:stretch>
-        </p:blipFill>
-        <p:spPr>
-          <a:xfrm rot="0">
-            <a:off x="1229360" y="1438275"/>
-            <a:ext cx="4126230" cy="3601720"/>
-          </a:xfrm>
-          <a:prstGeom prst="roundRect"/>
-          <a:solidFill>
-            <a:srgbClr val="EDEDED"/>
-          </a:solidFill>
-        </p:spPr>
-      </p:pic>
-      <p:pic>
-        <p:nvPicPr>
-          <p:cNvPr id="61" name="그림 37" descr="C:/Users/Admin1/AppData/Roaming/PolarisOffice/ETemp/20844_15003384/fImage330252883902.png"/>
+          <p:cNvPr id="61" name="그림 37" descr="C:/Users/nwond/AppData/Roaming/PolarisOffice/ETemp/19028_11857112/fImage330252883902.png"/>
           <p:cNvPicPr>
             <a:picLocks noChangeAspect="1"/>
           </p:cNvPicPr>
@@ -10738,7 +10472,7 @@
         <p:spPr>
           <a:xfrm rot="0">
             <a:off x="6839585" y="1447165"/>
-            <a:ext cx="2372995" cy="2455545"/>
+            <a:ext cx="2373630" cy="3561715"/>
           </a:xfrm>
           <a:prstGeom prst="roundRect"/>
           <a:solidFill>
@@ -10746,16 +10480,128 @@
           </a:solidFill>
         </p:spPr>
       </p:pic>
+      <p:sp>
+        <p:nvSpPr>
+          <p:cNvPr id="69" name="텍스트 상자 6"/>
+          <p:cNvSpPr txBox="1">
+            <a:spLocks/>
+          </p:cNvSpPr>
+          <p:nvPr/>
+        </p:nvSpPr>
+        <p:spPr>
+          <a:xfrm rot="0">
+            <a:off x="1221105" y="5226685"/>
+            <a:ext cx="4147185" cy="954405"/>
+          </a:xfrm>
+          <a:prstGeom prst="rect"/>
+          <a:noFill/>
+          <a:ln w="0">
+            <a:noFill/>
+            <a:prstDash/>
+          </a:ln>
+        </p:spPr>
+        <p:txBody>
+          <a:bodyPr wrap="square" lIns="89535" tIns="46355" rIns="89535" bIns="46355" vert="horz" anchor="t">
+            <a:spAutoFit/>
+          </a:bodyPr>
+          <a:lstStyle/>
+          <a:p>
+            <a:pPr marL="0" indent="0" rtl="0" algn="l" defTabSz="914400" eaLnBrk="1" latinLnBrk="0" hangingPunct="1">
+              <a:buFontTx/>
+              <a:buNone/>
+            </a:pPr>
+            <a:r>
+              <a:rPr sz="2000" b="1">
+                <a:solidFill>
+                  <a:srgbClr val="0611F2"/>
+                </a:solidFill>
+                <a:latin typeface="맑은 고딕" charset="0"/>
+                <a:ea typeface="맑은 고딕" charset="0"/>
+              </a:rPr>
+              <a:t>2</a:t>
+            </a:r>
+            <a:r>
+              <a:rPr sz="2000" b="1">
+                <a:solidFill>
+                  <a:srgbClr val="0611F2"/>
+                </a:solidFill>
+                <a:latin typeface="맑은 고딕" charset="0"/>
+                <a:ea typeface="맑은 고딕" charset="0"/>
+              </a:rPr>
+              <a:t>7</a:t>
+            </a:r>
+            <a:r>
+              <a:rPr sz="2000" b="1">
+                <a:solidFill>
+                  <a:srgbClr val="0611F2"/>
+                </a:solidFill>
+                <a:latin typeface="맑은 고딕" charset="0"/>
+                <a:ea typeface="맑은 고딕" charset="0"/>
+              </a:rPr>
+              <a:t>.</a:t>
+            </a:r>
+            <a:r>
+              <a:rPr sz="2000">
+                <a:solidFill>
+                  <a:srgbClr val="0611F2"/>
+                </a:solidFill>
+                <a:latin typeface="맑은 고딕" charset="0"/>
+                <a:ea typeface="맑은 고딕" charset="0"/>
+              </a:rPr>
+              <a:t> </a:t>
+            </a:r>
+            <a:r>
+              <a:rPr sz="1800">
+                <a:latin typeface="맑은 고딕" charset="0"/>
+                <a:ea typeface="맑은 고딕" charset="0"/>
+              </a:rPr>
+              <a:t>그다음으로</a:t>
+            </a:r>
+            <a:r>
+              <a:rPr sz="1800">
+                <a:latin typeface="맑은 고딕" charset="0"/>
+                <a:ea typeface="맑은 고딕" charset="0"/>
+              </a:rPr>
+              <a:t> C# Script를 생성하고 </a:t>
+            </a:r>
+            <a:r>
+              <a:rPr lang="ko-KR" sz="1800">
+                <a:latin typeface="맑은 고딕" charset="0"/>
+                <a:ea typeface="맑은 고딕" charset="0"/>
+              </a:rPr>
+              <a:t>P</a:t>
+            </a:r>
+            <a:r>
+              <a:rPr lang="ko-KR" sz="1800">
+                <a:latin typeface="맑은 고딕" charset="0"/>
+                <a:ea typeface="맑은 고딕" charset="0"/>
+              </a:rPr>
+              <a:t>layfabManager</a:t>
+            </a:r>
+            <a:r>
+              <a:rPr sz="1800">
+                <a:latin typeface="맑은 고딕" charset="0"/>
+                <a:ea typeface="맑은 고딕" charset="0"/>
+              </a:rPr>
+              <a:t>라는 이름으로 정의합니다.</a:t>
+            </a:r>
+            <a:endParaRPr lang="ko-KR" altLang="en-US" sz="1800">
+              <a:latin typeface="맑은 고딕" charset="0"/>
+              <a:ea typeface="맑은 고딕" charset="0"/>
+            </a:endParaRPr>
+          </a:p>
+        </p:txBody>
+      </p:sp>
       <p:pic>
         <p:nvPicPr>
-          <p:cNvPr id="62" name="그림 38" descr="C:/Users/Admin1/AppData/Roaming/PolarisOffice/ETemp/20844_15003384/fImage2273289153.png"/>
+          <p:cNvPr id="70" name="그림 7" descr="C:/Users/nwond/AppData/Roaming/PolarisOffice/ETemp/19028_11857112/fImage502229141.png"/>
           <p:cNvPicPr>
             <a:picLocks noChangeAspect="1"/>
           </p:cNvPicPr>
           <p:nvPr/>
         </p:nvPicPr>
         <p:blipFill rotWithShape="1">
-          <a:blip r:embed="rId5" cstate="hqprint">
+          <a:blip r:embed="rId12" cstate="hqprint">
             <a:extLst>
               <a:ext uri="{28A0092B-C50C-407E-A947-70E740481C1C}">
                 <a14:useLocalDpi xmlns:a14="http://schemas.microsoft.com/office/drawing/2010/main"/>
@@ -10768,8 +10614,8 @@
         </p:blipFill>
         <p:spPr>
           <a:xfrm rot="0">
-            <a:off x="9874250" y="3198495"/>
-            <a:ext cx="704215" cy="707390"/>
+            <a:off x="1231900" y="1447165"/>
+            <a:ext cx="2846070" cy="3559810"/>
           </a:xfrm>
           <a:prstGeom prst="roundRect"/>
           <a:solidFill>
@@ -10777,50 +10623,16 @@
           </a:solidFill>
         </p:spPr>
       </p:pic>
-      <p:cxnSp>
-        <p:nvCxnSpPr>
-          <p:cNvPr id="67" name="도형 17"/>
-          <p:cNvCxnSpPr>
-            <a:endCxn id="68" idx="2"/>
-          </p:cNvCxnSpPr>
-          <p:nvPr/>
-        </p:nvCxnSpPr>
-        <p:spPr>
-          <a:xfrm rot="0" flipH="1" flipV="1">
-            <a:off x="10224770" y="2825115"/>
-            <a:ext cx="1905" cy="365125"/>
-          </a:xfrm>
-          <a:prstGeom prst="straightConnector1"/>
-          <a:ln w="6350" cap="flat" cmpd="sng">
-            <a:prstDash/>
-            <a:tailEnd type="triangle" w="med" len="med"/>
-          </a:ln>
-        </p:spPr>
-        <p:style>
-          <a:lnRef idx="1">
-            <a:schemeClr val="accent1"/>
-          </a:lnRef>
-          <a:fillRef idx="0">
-            <a:schemeClr val="accent1"/>
-          </a:fillRef>
-          <a:effectRef idx="0">
-            <a:schemeClr val="accent1"/>
-          </a:effectRef>
-          <a:fontRef idx="minor">
-            <a:schemeClr val="tx1"/>
-          </a:fontRef>
-        </p:style>
-      </p:cxnSp>
       <p:pic>
         <p:nvPicPr>
-          <p:cNvPr id="68" name="그림 14" descr="C:/Users/Admin1/AppData/Roaming/PolarisOffice/ETemp/20844_15003384/fImage88133606500.png"/>
+          <p:cNvPr id="72" name="그림 12" descr="C:/Users/nwond/AppData/Roaming/PolarisOffice/ETemp/19028_11857112/fImage22962948467.png"/>
           <p:cNvPicPr>
             <a:picLocks noChangeAspect="1"/>
           </p:cNvPicPr>
           <p:nvPr/>
         </p:nvPicPr>
         <p:blipFill rotWithShape="1">
-          <a:blip r:embed="rId11" cstate="print">
+          <a:blip r:embed="rId13" cstate="print">
             <a:extLst>
               <a:ext uri="{28A0092B-C50C-407E-A947-70E740481C1C}">
                 <a14:useLocalDpi xmlns:a14="http://schemas.microsoft.com/office/drawing/2010/main" val="0"/>
@@ -10833,8 +10645,68 @@
         </p:blipFill>
         <p:spPr>
           <a:xfrm rot="0">
-            <a:off x="9492615" y="1438910"/>
-            <a:ext cx="1464945" cy="1386840"/>
+            <a:off x="4502150" y="2726690"/>
+            <a:ext cx="866775" cy="1022350"/>
+          </a:xfrm>
+          <a:prstGeom prst="roundRect"/>
+          <a:solidFill>
+            <a:srgbClr val="EDEDED"/>
+          </a:solidFill>
+        </p:spPr>
+      </p:pic>
+      <p:pic>
+        <p:nvPicPr>
+          <p:cNvPr id="71" name="그림 8" descr="C:/Users/nwond/AppData/Roaming/PolarisOffice/ETemp/19028_11857112/fImage2242172926334.png"/>
+          <p:cNvPicPr>
+            <a:picLocks noChangeAspect="1"/>
+          </p:cNvPicPr>
+          <p:nvPr/>
+        </p:nvPicPr>
+        <p:blipFill rotWithShape="1">
+          <a:blip r:embed="rId14" cstate="hqprint">
+            <a:extLst>
+              <a:ext uri="{28A0092B-C50C-407E-A947-70E740481C1C}">
+                <a14:useLocalDpi xmlns:a14="http://schemas.microsoft.com/office/drawing/2010/main"/>
+              </a:ext>
+            </a:extLst>
+          </a:blip>
+          <a:stretch>
+            <a:fillRect/>
+          </a:stretch>
+        </p:blipFill>
+        <p:spPr>
+          <a:xfrm rot="0">
+            <a:off x="3850640" y="2982595"/>
+            <a:ext cx="823595" cy="484505"/>
+          </a:xfrm>
+          <a:prstGeom prst="rect"/>
+          <a:noFill/>
+        </p:spPr>
+      </p:pic>
+      <p:pic>
+        <p:nvPicPr>
+          <p:cNvPr id="73" name="그림 15" descr="C:/Users/nwond/AppData/Roaming/PolarisOffice/ETemp/19028_11857112/fImage88642956500.png"/>
+          <p:cNvPicPr>
+            <a:picLocks noChangeAspect="1"/>
+          </p:cNvPicPr>
+          <p:nvPr/>
+        </p:nvPicPr>
+        <p:blipFill rotWithShape="1">
+          <a:blip r:embed="rId15" cstate="print">
+            <a:extLst>
+              <a:ext uri="{28A0092B-C50C-407E-A947-70E740481C1C}">
+                <a14:useLocalDpi xmlns:a14="http://schemas.microsoft.com/office/drawing/2010/main" val="0"/>
+              </a:ext>
+            </a:extLst>
+          </a:blip>
+          <a:stretch>
+            <a:fillRect/>
+          </a:stretch>
+        </p:blipFill>
+        <p:spPr>
+          <a:xfrm rot="0">
+            <a:off x="9445625" y="2313940"/>
+            <a:ext cx="1505585" cy="1826260"/>
           </a:xfrm>
           <a:prstGeom prst="roundRect"/>
           <a:solidFill>
@@ -10987,8 +10859,8 @@
         </p:nvSpPr>
         <p:spPr>
           <a:xfrm rot="0">
-            <a:off x="6828155" y="3013075"/>
-            <a:ext cx="4133215" cy="954405"/>
+            <a:off x="6828155" y="2607945"/>
+            <a:ext cx="4133850" cy="954405"/>
           </a:xfrm>
           <a:prstGeom prst="rect"/>
           <a:noFill/>
@@ -11015,27 +10887,7 @@
                 <a:latin typeface="맑은 고딕" charset="0"/>
                 <a:ea typeface="맑은 고딕" charset="0"/>
               </a:rPr>
-              <a:t>3</a:t>
-            </a:r>
-            <a:r>
-              <a:rPr lang="ko-KR" sz="2000" b="1">
-                <a:solidFill>
-                  <a:srgbClr val="0611F2"/>
-                </a:solidFill>
-                <a:latin typeface="맑은 고딕" charset="0"/>
-                <a:ea typeface="맑은 고딕" charset="0"/>
-              </a:rPr>
-              <a:t>1</a:t>
-            </a:r>
-            <a:r>
-              <a:rPr lang="ko-KR" sz="2000" b="1">
-                <a:solidFill>
-                  <a:srgbClr val="0611F2"/>
-                </a:solidFill>
-                <a:latin typeface="맑은 고딕" charset="0"/>
-                <a:ea typeface="맑은 고딕" charset="0"/>
-              </a:rPr>
-              <a:t>.</a:t>
+              <a:t>31.</a:t>
             </a:r>
             <a:r>
               <a:rPr lang="ko-KR" sz="2000">
@@ -11052,21 +10904,56 @@
                 <a:latin typeface="맑은 고딕" charset="0"/>
                 <a:ea typeface="맑은 고딕" charset="0"/>
               </a:rPr>
-              <a:t>그</a:t>
-            </a:r>
-            <a:r>
-              <a:rPr lang="ko-KR" sz="1800">
-                <a:latin typeface="맑은 고딕" charset="0"/>
-                <a:ea typeface="맑은 고딕" charset="0"/>
-              </a:rPr>
-              <a:t>다음으로</a:t>
-            </a:r>
-            <a:r>
-              <a:rPr lang="ko-KR" sz="1800">
-                <a:latin typeface="맑은 고딕" charset="0"/>
-                <a:ea typeface="맑은 고딕" charset="0"/>
-              </a:rPr>
-              <a:t> Email 오브젝트의 앵커를 지정하고 위치와 크기를 설정합니다.</a:t>
+              <a:t>그다음으로</a:t>
+            </a:r>
+            <a:r>
+              <a:rPr lang="ko-KR" sz="1800">
+                <a:latin typeface="맑은 고딕" charset="0"/>
+                <a:ea typeface="맑은 고딕" charset="0"/>
+              </a:rPr>
+              <a:t> Pl</a:t>
+            </a:r>
+            <a:r>
+              <a:rPr lang="ko-KR" sz="1800">
+                <a:latin typeface="맑은 고딕" charset="0"/>
+                <a:ea typeface="맑은 고딕" charset="0"/>
+              </a:rPr>
+              <a:t>ay</a:t>
+            </a:r>
+            <a:r>
+              <a:rPr lang="ko-KR" sz="1800">
+                <a:latin typeface="맑은 고딕" charset="0"/>
+                <a:ea typeface="맑은 고딕" charset="0"/>
+              </a:rPr>
+              <a:t>f</a:t>
+            </a:r>
+            <a:r>
+              <a:rPr lang="ko-KR" sz="1800">
+                <a:latin typeface="맑은 고딕" charset="0"/>
+                <a:ea typeface="맑은 고딕" charset="0"/>
+              </a:rPr>
+              <a:t>abManager </a:t>
+            </a:r>
+            <a:r>
+              <a:rPr lang="ko-KR" sz="1800">
+                <a:latin typeface="맑은 고딕" charset="0"/>
+                <a:ea typeface="맑은 고딕" charset="0"/>
+              </a:rPr>
+              <a:t>스크립트에서 InputField 변수를 </a:t>
+            </a:r>
+            <a:r>
+              <a:rPr lang="ko-KR" sz="1800">
+                <a:latin typeface="맑은 고딕" charset="0"/>
+                <a:ea typeface="맑은 고딕" charset="0"/>
+              </a:rPr>
+              <a:t>2</a:t>
+            </a:r>
+            <a:r>
+              <a:rPr lang="ko-KR" sz="1800">
+                <a:latin typeface="맑은 고딕" charset="0"/>
+                <a:ea typeface="맑은 고딕" charset="0"/>
+              </a:rPr>
+              <a:t>개 선언합니다.</a:t>
             </a:r>
             <a:endParaRPr lang="ko-KR" altLang="en-US" sz="1800">
               <a:latin typeface="맑은 고딕" charset="0"/>
@@ -11077,7 +10964,7 @@
       </p:sp>
       <p:pic>
         <p:nvPicPr>
-          <p:cNvPr id="62" name="그림 7" descr="C:/Users/nwond/AppData/Roaming/PolarisOffice/ETemp/21888_20881416/fImage117912479169.png"/>
+          <p:cNvPr id="62" name="그림 7"/>
           <p:cNvPicPr>
             <a:picLocks noChangeAspect="1"/>
           </p:cNvPicPr>
@@ -11170,37 +11057,6 @@
           </a:p>
         </p:txBody>
       </p:sp>
-      <p:pic>
-        <p:nvPicPr>
-          <p:cNvPr id="64" name="그림 17" descr="C:/Users/nwond/AppData/Roaming/PolarisOffice/ETemp/21888_20881416/fImage117543619169.png"/>
-          <p:cNvPicPr>
-            <a:picLocks noChangeAspect="1"/>
-          </p:cNvPicPr>
-          <p:nvPr/>
-        </p:nvPicPr>
-        <p:blipFill rotWithShape="1">
-          <a:blip r:embed="rId13" cstate="hqprint">
-            <a:extLst>
-              <a:ext uri="{28A0092B-C50C-407E-A947-70E740481C1C}">
-                <a14:useLocalDpi xmlns:a14="http://schemas.microsoft.com/office/drawing/2010/main"/>
-              </a:ext>
-            </a:extLst>
-          </a:blip>
-          <a:stretch>
-            <a:fillRect/>
-          </a:stretch>
-        </p:blipFill>
-        <p:spPr>
-          <a:xfrm rot="0">
-            <a:off x="6825615" y="1434465"/>
-            <a:ext cx="4133215" cy="1476375"/>
-          </a:xfrm>
-          <a:prstGeom prst="roundRect"/>
-          <a:solidFill>
-            <a:srgbClr val="EDEDED"/>
-          </a:solidFill>
-        </p:spPr>
-      </p:pic>
       <p:sp>
         <p:nvSpPr>
           <p:cNvPr id="66" name="텍스트 상자 24"/>
@@ -11211,8 +11067,8 @@
         </p:nvSpPr>
         <p:spPr>
           <a:xfrm rot="0">
-            <a:off x="6828155" y="5352415"/>
-            <a:ext cx="4130675" cy="954405"/>
+            <a:off x="6828155" y="5365115"/>
+            <a:ext cx="4138295" cy="954405"/>
           </a:xfrm>
           <a:prstGeom prst="rect"/>
           <a:noFill/>
@@ -11239,17 +11095,7 @@
                 <a:latin typeface="맑은 고딕" charset="0"/>
                 <a:ea typeface="맑은 고딕" charset="0"/>
               </a:rPr>
-              <a:t>32</a:t>
-            </a:r>
-            <a:r>
-              <a:rPr lang="ko-KR" sz="2000" b="1">
-                <a:solidFill>
-                  <a:srgbClr val="0611F2"/>
-                </a:solidFill>
-                <a:latin typeface="맑은 고딕" charset="0"/>
-                <a:ea typeface="맑은 고딕" charset="0"/>
-              </a:rPr>
-              <a:t>.</a:t>
+              <a:t>32.</a:t>
             </a:r>
             <a:r>
               <a:rPr lang="ko-KR" sz="2000">
@@ -11266,28 +11112,42 @@
                 <a:latin typeface="맑은 고딕" charset="0"/>
                 <a:ea typeface="맑은 고딕" charset="0"/>
               </a:rPr>
-              <a:t>그</a:t>
-            </a:r>
-            <a:r>
-              <a:rPr lang="ko-KR" sz="1800">
-                <a:latin typeface="맑은 고딕" charset="0"/>
-                <a:ea typeface="맑은 고딕" charset="0"/>
-              </a:rPr>
-              <a:t>러고 </a:t>
-            </a:r>
-            <a:r>
-              <a:rPr lang="ko-KR" sz="1800">
-                <a:latin typeface="맑은 고딕" charset="0"/>
-                <a:ea typeface="맑은 고딕" charset="0"/>
-              </a:rPr>
-              <a:t>나서</a:t>
-            </a:r>
-            <a:r>
-              <a:rPr lang="ko-KR" sz="1800">
-                <a:latin typeface="맑은 고딕" charset="0"/>
-                <a:ea typeface="맑은 고딕" charset="0"/>
-              </a:rPr>
-              <a:t> PhotonSetting 스크립트에서 InputField 변수를 3개 선언합니다.</a:t>
+              <a:t>그러고 나서 LoginSuccess( ) 함수를 선언</a:t>
+            </a:r>
+            <a:r>
+              <a:rPr lang="ko-KR" sz="1800">
+                <a:latin typeface="맑은 고딕" charset="0"/>
+                <a:ea typeface="맑은 고딕" charset="0"/>
+              </a:rPr>
+              <a:t>한 </a:t>
+            </a:r>
+            <a:r>
+              <a:rPr lang="ko-KR" sz="1800">
+                <a:latin typeface="맑은 고딕" charset="0"/>
+                <a:ea typeface="맑은 고딕" charset="0"/>
+              </a:rPr>
+              <a:t>다음</a:t>
+            </a:r>
+            <a:r>
+              <a:rPr lang="ko-KR" sz="1800">
+                <a:latin typeface="맑은 고딕" charset="0"/>
+                <a:ea typeface="맑은 고딕" charset="0"/>
+              </a:rPr>
+              <a:t> 로그인 </a:t>
+            </a:r>
+            <a:r>
+              <a:rPr lang="ko-KR" sz="1800">
+                <a:latin typeface="맑은 고딕" charset="0"/>
+                <a:ea typeface="맑은 고딕" charset="0"/>
+              </a:rPr>
+              <a:t>성공 시 인증 절차를 </a:t>
+            </a:r>
+            <a:r>
+              <a:rPr lang="ko-KR" sz="1800">
+                <a:latin typeface="맑은 고딕" charset="0"/>
+                <a:ea typeface="맑은 고딕" charset="0"/>
+              </a:rPr>
+              <a:t>실행합니다.</a:t>
             </a:r>
             <a:endParaRPr lang="ko-KR" altLang="en-US" sz="1800">
               <a:latin typeface="맑은 고딕" charset="0"/>
@@ -11298,38 +11158,7 @@
       </p:sp>
       <p:pic>
         <p:nvPicPr>
-          <p:cNvPr id="67" name="그림 1" descr="C:/Users/nwond/AppData/Roaming/PolarisOffice/ETemp/21888_20881416/fImage8128030941.png"/>
-          <p:cNvPicPr>
-            <a:picLocks noChangeAspect="1"/>
-          </p:cNvPicPr>
-          <p:nvPr/>
-        </p:nvPicPr>
-        <p:blipFill rotWithShape="1">
-          <a:blip r:embed="rId15" cstate="print">
-            <a:extLst>
-              <a:ext uri="{28A0092B-C50C-407E-A947-70E740481C1C}">
-                <a14:useLocalDpi xmlns:a14="http://schemas.microsoft.com/office/drawing/2010/main" val="0"/>
-              </a:ext>
-            </a:extLst>
-          </a:blip>
-          <a:stretch>
-            <a:fillRect/>
-          </a:stretch>
-        </p:blipFill>
-        <p:spPr>
-          <a:xfrm rot="0">
-            <a:off x="6827520" y="4086860"/>
-            <a:ext cx="4130675" cy="1190625"/>
-          </a:xfrm>
-          <a:prstGeom prst="roundRect"/>
-          <a:solidFill>
-            <a:srgbClr val="EDEDED"/>
-          </a:solidFill>
-        </p:spPr>
-      </p:pic>
-      <p:pic>
-        <p:nvPicPr>
-          <p:cNvPr id="68" name="그림 21" descr="C:/Users/nwond/AppData/Roaming/PolarisOffice/ETemp/21888_20881416/fImage30173824604.png"/>
+          <p:cNvPr id="68" name="그림 21"/>
           <p:cNvPicPr>
             <a:picLocks noChangeAspect="1"/>
           </p:cNvPicPr>
@@ -11360,7 +11189,7 @@
       </p:pic>
       <p:pic>
         <p:nvPicPr>
-          <p:cNvPr id="69" name="그림 22" descr="C:/Users/nwond/AppData/Roaming/PolarisOffice/ETemp/21888_20881416/fImage87134105436.png"/>
+          <p:cNvPr id="69" name="그림 22"/>
           <p:cNvPicPr>
             <a:picLocks noChangeAspect="1"/>
           </p:cNvPicPr>
@@ -11487,6 +11316,68 @@
           </a:p>
         </p:txBody>
       </p:sp>
+      <p:pic>
+        <p:nvPicPr>
+          <p:cNvPr id="71" name="그림 1" descr="C:/Users/nwond/AppData/Roaming/PolarisOffice/ETemp/19028_11857112/fImage682492879169.png"/>
+          <p:cNvPicPr>
+            <a:picLocks noChangeAspect="1"/>
+          </p:cNvPicPr>
+          <p:nvPr/>
+        </p:nvPicPr>
+        <p:blipFill rotWithShape="1">
+          <a:blip r:embed="rId18" cstate="print">
+            <a:extLst>
+              <a:ext uri="{28A0092B-C50C-407E-A947-70E740481C1C}">
+                <a14:useLocalDpi xmlns:a14="http://schemas.microsoft.com/office/drawing/2010/main" val="0"/>
+              </a:ext>
+            </a:extLst>
+          </a:blip>
+          <a:stretch>
+            <a:fillRect/>
+          </a:stretch>
+        </p:blipFill>
+        <p:spPr>
+          <a:xfrm rot="0">
+            <a:off x="6833235" y="1440815"/>
+            <a:ext cx="4127500" cy="1079500"/>
+          </a:xfrm>
+          <a:prstGeom prst="roundRect"/>
+          <a:solidFill>
+            <a:srgbClr val="EDEDED"/>
+          </a:solidFill>
+        </p:spPr>
+      </p:pic>
+      <p:pic>
+        <p:nvPicPr>
+          <p:cNvPr id="72" name="그림 20" descr="C:/Users/nwond/AppData/Roaming/PolarisOffice/ETemp/19028_11857112/fImage924062985724.png"/>
+          <p:cNvPicPr>
+            <a:picLocks noChangeAspect="1"/>
+          </p:cNvPicPr>
+          <p:nvPr/>
+        </p:nvPicPr>
+        <p:blipFill rotWithShape="1">
+          <a:blip r:embed="rId19" cstate="print">
+            <a:extLst>
+              <a:ext uri="{28A0092B-C50C-407E-A947-70E740481C1C}">
+                <a14:useLocalDpi xmlns:a14="http://schemas.microsoft.com/office/drawing/2010/main" val="0"/>
+              </a:ext>
+            </a:extLst>
+          </a:blip>
+          <a:stretch>
+            <a:fillRect/>
+          </a:stretch>
+        </p:blipFill>
+        <p:spPr>
+          <a:xfrm rot="0">
+            <a:off x="6826885" y="3674745"/>
+            <a:ext cx="4139565" cy="1639570"/>
+          </a:xfrm>
+          <a:prstGeom prst="roundRect"/>
+          <a:solidFill>
+            <a:srgbClr val="EDEDED"/>
+          </a:solidFill>
+        </p:spPr>
+      </p:pic>
     </p:spTree>
   </p:cSld>
   <p:clrMapOvr>
@@ -11632,8 +11523,8 @@
         </p:nvSpPr>
         <p:spPr>
           <a:xfrm rot="0">
-            <a:off x="1231900" y="3809365"/>
-            <a:ext cx="4135120" cy="2338705"/>
+            <a:off x="1225550" y="5274310"/>
+            <a:ext cx="4135755" cy="954405"/>
           </a:xfrm>
           <a:prstGeom prst="rect"/>
           <a:noFill/>
@@ -11660,8 +11551,171 @@
                 <a:latin typeface="맑은 고딕" charset="0"/>
                 <a:ea typeface="맑은 고딕" charset="0"/>
               </a:rPr>
-              <a:t>3</a:t>
-            </a:r>
+              <a:t>33. </a:t>
+            </a:r>
+            <a:r>
+              <a:rPr lang="ko-KR" sz="1800">
+                <a:latin typeface="맑은 고딕" charset="0"/>
+                <a:ea typeface="맑은 고딕" charset="0"/>
+              </a:rPr>
+              <a:t>그리고 </a:t>
+            </a:r>
+            <a:r>
+              <a:rPr lang="ko-KR" sz="1800">
+                <a:latin typeface="맑은 고딕" charset="0"/>
+                <a:ea typeface="맑은 고딕" charset="0"/>
+              </a:rPr>
+              <a:t>Fa</a:t>
+            </a:r>
+            <a:r>
+              <a:rPr lang="ko-KR" sz="1800">
+                <a:latin typeface="맑은 고딕" charset="0"/>
+                <a:ea typeface="맑은 고딕" charset="0"/>
+              </a:rPr>
+              <a:t>i</a:t>
+            </a:r>
+            <a:r>
+              <a:rPr lang="ko-KR" sz="1800">
+                <a:latin typeface="맑은 고딕" charset="0"/>
+                <a:ea typeface="맑은 고딕" charset="0"/>
+              </a:rPr>
+              <a:t>lure</a:t>
+            </a:r>
+            <a:r>
+              <a:rPr lang="ko-KR" sz="1800">
+                <a:latin typeface="맑은 고딕" charset="0"/>
+                <a:ea typeface="맑은 고딕" charset="0"/>
+              </a:rPr>
+              <a:t>(Pl</a:t>
+            </a:r>
+            <a:r>
+              <a:rPr lang="ko-KR" sz="1800">
+                <a:latin typeface="맑은 고딕" charset="0"/>
+                <a:ea typeface="맑은 고딕" charset="0"/>
+              </a:rPr>
+              <a:t>a</a:t>
+            </a:r>
+            <a:r>
+              <a:rPr lang="ko-KR" sz="1800">
+                <a:latin typeface="맑은 고딕" charset="0"/>
+                <a:ea typeface="맑은 고딕" charset="0"/>
+              </a:rPr>
+              <a:t>yF</a:t>
+            </a:r>
+            <a:r>
+              <a:rPr lang="ko-KR" sz="1800">
+                <a:latin typeface="맑은 고딕" charset="0"/>
+                <a:ea typeface="맑은 고딕" charset="0"/>
+              </a:rPr>
+              <a:t>abError)</a:t>
+            </a:r>
+            <a:r>
+              <a:rPr lang="ko-KR" sz="1800">
+                <a:latin typeface="맑은 고딕" charset="0"/>
+                <a:ea typeface="맑은 고딕" charset="0"/>
+              </a:rPr>
+              <a:t> 함수를 </a:t>
+            </a:r>
+            <a:r>
+              <a:rPr lang="ko-KR" sz="1800">
+                <a:latin typeface="맑은 고딕" charset="0"/>
+                <a:ea typeface="맑은 고딕" charset="0"/>
+              </a:rPr>
+              <a:t>선언한 다음 </a:t>
+            </a:r>
+            <a:r>
+              <a:rPr lang="ko-KR" sz="1800">
+                <a:latin typeface="맑은 고딕" charset="0"/>
+                <a:ea typeface="맑은 고딕" charset="0"/>
+              </a:rPr>
+              <a:t>A</a:t>
+            </a:r>
+            <a:r>
+              <a:rPr lang="ko-KR" sz="1800">
+                <a:latin typeface="맑은 고딕" charset="0"/>
+                <a:ea typeface="맑은 고딕" charset="0"/>
+              </a:rPr>
+              <a:t>la</a:t>
+            </a:r>
+            <a:r>
+              <a:rPr lang="ko-KR" sz="1800">
+                <a:latin typeface="맑은 고딕" charset="0"/>
+                <a:ea typeface="맑은 고딕" charset="0"/>
+              </a:rPr>
+              <a:t>r</a:t>
+            </a:r>
+            <a:r>
+              <a:rPr lang="ko-KR" sz="1800">
+                <a:latin typeface="맑은 고딕" charset="0"/>
+                <a:ea typeface="맑은 고딕" charset="0"/>
+              </a:rPr>
+              <a:t>m 클래스의 Show(</a:t>
+            </a:r>
+            <a:r>
+              <a:rPr lang="ko-KR" sz="1800">
+                <a:latin typeface="맑은 고딕" charset="0"/>
+                <a:ea typeface="맑은 고딕" charset="0"/>
+              </a:rPr>
+              <a:t> </a:t>
+            </a:r>
+            <a:r>
+              <a:rPr lang="ko-KR" sz="1800">
+                <a:latin typeface="맑은 고딕" charset="0"/>
+                <a:ea typeface="맑은 고딕" charset="0"/>
+              </a:rPr>
+              <a:t>)</a:t>
+            </a:r>
+            <a:r>
+              <a:rPr lang="ko-KR" sz="1800">
+                <a:latin typeface="맑은 고딕" charset="0"/>
+                <a:ea typeface="맑은 고딕" charset="0"/>
+              </a:rPr>
+              <a:t> 함수를 </a:t>
+            </a:r>
+            <a:r>
+              <a:rPr lang="ko-KR" sz="1800">
+                <a:latin typeface="맑은 고딕" charset="0"/>
+                <a:ea typeface="맑은 고딕" charset="0"/>
+              </a:rPr>
+              <a:t>호출합니다.</a:t>
+            </a:r>
+            <a:endParaRPr lang="ko-KR" altLang="en-US" sz="1800">
+              <a:latin typeface="맑은 고딕" charset="0"/>
+              <a:ea typeface="맑은 고딕" charset="0"/>
+            </a:endParaRPr>
+          </a:p>
+        </p:txBody>
+      </p:sp>
+      <p:sp>
+        <p:nvSpPr>
+          <p:cNvPr id="67" name="텍스트 상자 24"/>
+          <p:cNvSpPr txBox="1">
+            <a:spLocks/>
+          </p:cNvSpPr>
+          <p:nvPr/>
+        </p:nvSpPr>
+        <p:spPr>
+          <a:xfrm rot="0">
+            <a:off x="6804025" y="4163060"/>
+            <a:ext cx="4155440" cy="2061845"/>
+          </a:xfrm>
+          <a:prstGeom prst="rect"/>
+          <a:noFill/>
+          <a:ln w="0">
+            <a:noFill/>
+            <a:prstDash/>
+          </a:ln>
+        </p:spPr>
+        <p:txBody>
+          <a:bodyPr wrap="square" lIns="89535" tIns="46355" rIns="89535" bIns="46355" numCol="1" vert="horz" anchor="t">
+            <a:spAutoFit/>
+          </a:bodyPr>
+          <a:lstStyle/>
+          <a:p>
+            <a:pPr marL="0" indent="0" rtl="0" algn="l" defTabSz="914400" eaLnBrk="1" latinLnBrk="0" hangingPunct="1">
+              <a:buFontTx/>
+              <a:buNone/>
+            </a:pPr>
             <a:r>
               <a:rPr lang="ko-KR" sz="2000" b="1">
                 <a:solidFill>
@@ -11670,26 +11724,16 @@
                 <a:latin typeface="맑은 고딕" charset="0"/>
                 <a:ea typeface="맑은 고딕" charset="0"/>
               </a:rPr>
-              <a:t>3</a:t>
-            </a:r>
-            <a:r>
-              <a:rPr lang="ko-KR" sz="2000" b="1">
+              <a:t>37.</a:t>
+            </a:r>
+            <a:r>
+              <a:rPr lang="ko-KR" sz="2000">
                 <a:solidFill>
                   <a:srgbClr val="0611F2"/>
                 </a:solidFill>
                 <a:latin typeface="맑은 고딕" charset="0"/>
                 <a:ea typeface="맑은 고딕" charset="0"/>
               </a:rPr>
-              <a:t>.</a:t>
-            </a:r>
-            <a:r>
-              <a:rPr lang="ko-KR" sz="2000" b="1">
-                <a:solidFill>
-                  <a:srgbClr val="0611F2"/>
-                </a:solidFill>
-                <a:latin typeface="맑은 고딕" charset="0"/>
-                <a:ea typeface="맑은 고딕" charset="0"/>
-              </a:rPr>
               <a:t> </a:t>
             </a:r>
             <a:r>
@@ -11697,42 +11741,21 @@
                 <a:latin typeface="맑은 고딕" charset="0"/>
                 <a:ea typeface="맑은 고딕" charset="0"/>
               </a:rPr>
-              <a:t>이제 LoginSuccess( ) 함수를 </a:t>
-            </a:r>
-            <a:r>
-              <a:rPr lang="ko-KR" sz="1800">
-                <a:latin typeface="맑은 고딕" charset="0"/>
-                <a:ea typeface="맑은 고딕" charset="0"/>
-              </a:rPr>
-              <a:t>선언한</a:t>
-            </a:r>
-            <a:r>
-              <a:rPr lang="ko-KR" sz="1800">
-                <a:latin typeface="맑은 고딕" charset="0"/>
-                <a:ea typeface="맑은 고딕" charset="0"/>
-              </a:rPr>
-              <a:t> </a:t>
-            </a:r>
-            <a:r>
-              <a:rPr lang="ko-KR" sz="1800">
-                <a:latin typeface="맑은 고딕" charset="0"/>
-                <a:ea typeface="맑은 고딕" charset="0"/>
-              </a:rPr>
-              <a:t>다음</a:t>
-            </a:r>
-            <a:r>
-              <a:rPr lang="ko-KR" sz="1800">
-                <a:latin typeface="맑은 고딕" charset="0"/>
-                <a:ea typeface="맑은 고딕" charset="0"/>
-              </a:rPr>
-              <a:t> AutomaticallySyncScene  </a:t>
-            </a:r>
-            <a:r>
-              <a:rPr lang="ko-KR" sz="1800">
-                <a:latin typeface="맑은 고딕" charset="0"/>
-                <a:ea typeface="맑은 고딕" charset="0"/>
-              </a:rPr>
-              <a:t>비활성화합니다.</a:t>
+              <a:t>그런 다음 Login( ) 함수를 </a:t>
+            </a:r>
+            <a:r>
+              <a:rPr lang="ko-KR" sz="1800">
+                <a:latin typeface="맑은 고딕" charset="0"/>
+                <a:ea typeface="맑은 고딕" charset="0"/>
+              </a:rPr>
+              <a:t>선언</a:t>
+            </a:r>
+            <a:r>
+              <a:rPr lang="ko-KR" sz="1800">
+                <a:latin typeface="맑은 고딕" charset="0"/>
+                <a:ea typeface="맑은 고딕" charset="0"/>
+              </a:rPr>
+              <a:t>하고 로그인에 대한 정보를 입력받습니다.</a:t>
             </a:r>
             <a:endParaRPr lang="ko-KR" altLang="en-US" sz="1800">
               <a:latin typeface="맑은 고딕" charset="0"/>
@@ -11759,84 +11782,7 @@
                 <a:latin typeface="맑은 고딕" charset="0"/>
                 <a:ea typeface="맑은 고딕" charset="0"/>
               </a:rPr>
-              <a:t>그리고</a:t>
-            </a:r>
-            <a:r>
-              <a:rPr lang="ko-KR" sz="1800">
-                <a:latin typeface="맑은 고딕" charset="0"/>
-                <a:ea typeface="맑은 고딕" charset="0"/>
-              </a:rPr>
-              <a:t> 로그인 인증 절차가 </a:t>
-            </a:r>
-            <a:r>
-              <a:rPr lang="ko-KR" sz="1800">
-                <a:latin typeface="맑은 고딕" charset="0"/>
-                <a:ea typeface="맑은 고딕" charset="0"/>
-              </a:rPr>
-              <a:t>성공되었을</a:t>
-            </a:r>
-            <a:r>
-              <a:rPr lang="ko-KR" sz="1800">
-                <a:latin typeface="맑은 고딕" charset="0"/>
-                <a:ea typeface="맑은 고딕" charset="0"/>
-              </a:rPr>
-              <a:t> </a:t>
-            </a:r>
-            <a:r>
-              <a:rPr lang="ko-KR" sz="1800">
-                <a:latin typeface="맑은 고딕" charset="0"/>
-                <a:ea typeface="맑은 고딕" charset="0"/>
-              </a:rPr>
-              <a:t>때</a:t>
-            </a:r>
-            <a:r>
-              <a:rPr lang="ko-KR" sz="1800">
-                <a:latin typeface="맑은 고딕" charset="0"/>
-                <a:ea typeface="맑은 고딕" charset="0"/>
-              </a:rPr>
-              <a:t> Photon Lobby씬으로 </a:t>
-            </a:r>
-            <a:r>
-              <a:rPr lang="ko-KR" sz="1800">
-                <a:latin typeface="맑은 고딕" charset="0"/>
-                <a:ea typeface="맑은 고딕" charset="0"/>
-              </a:rPr>
-              <a:t>이동하도록</a:t>
-            </a:r>
-            <a:r>
-              <a:rPr lang="ko-KR" sz="1800">
-                <a:latin typeface="맑은 고딕" charset="0"/>
-                <a:ea typeface="맑은 고딕" charset="0"/>
-              </a:rPr>
-              <a:t> </a:t>
-            </a:r>
-            <a:r>
-              <a:rPr lang="ko-KR" sz="1800">
-                <a:latin typeface="맑은 고딕" charset="0"/>
-                <a:ea typeface="맑은 고딕" charset="0"/>
-              </a:rPr>
-              <a:t>설정한 다음 게임 서버 </a:t>
-            </a:r>
-            <a:r>
-              <a:rPr lang="ko-KR" sz="1800">
-                <a:latin typeface="맑은 고딕" charset="0"/>
-                <a:ea typeface="맑은 고딕" charset="0"/>
-              </a:rPr>
-              <a:t>NickName을</a:t>
-            </a:r>
-            <a:r>
-              <a:rPr lang="ko-KR" sz="1800">
-                <a:latin typeface="맑은 고딕" charset="0"/>
-                <a:ea typeface="맑은 고딕" charset="0"/>
-              </a:rPr>
-              <a:t> </a:t>
-            </a:r>
-            <a:r>
-              <a:rPr lang="ko-KR" sz="1800">
-                <a:latin typeface="맑은 고딕" charset="0"/>
-                <a:ea typeface="맑은 고딕" charset="0"/>
-              </a:rPr>
-              <a:t>설정합니다.</a:t>
+              <a:t>그다음으로 로그인의 여부를 설정하는 LoginWithEmailAddress( ) 함수로 로그인 인증 절차를 확인합니다.</a:t>
             </a:r>
             <a:endParaRPr lang="ko-KR" altLang="en-US" sz="1800">
               <a:latin typeface="맑은 고딕" charset="0"/>
@@ -11847,14 +11793,14 @@
       </p:sp>
       <p:pic>
         <p:nvPicPr>
-          <p:cNvPr id="66" name="그림 30"/>
+          <p:cNvPr id="69" name="그림 24" descr="C:/Users/nwond/AppData/Roaming/PolarisOffice/ETemp/19028_11857112/fImage477953001478.png"/>
           <p:cNvPicPr>
             <a:picLocks noChangeAspect="1"/>
           </p:cNvPicPr>
           <p:nvPr/>
         </p:nvPicPr>
         <p:blipFill rotWithShape="1">
-          <a:blip r:embed="rId2" cstate="print">
+          <a:blip r:embed="rId8" cstate="print">
             <a:extLst>
               <a:ext uri="{28A0092B-C50C-407E-A947-70E740481C1C}">
                 <a14:useLocalDpi xmlns:a14="http://schemas.microsoft.com/office/drawing/2010/main" val="0"/>
@@ -11867,8 +11813,8 @@
         </p:blipFill>
         <p:spPr>
           <a:xfrm rot="0">
-            <a:off x="1231265" y="1455420"/>
-            <a:ext cx="4144645" cy="2179955"/>
+            <a:off x="1228725" y="4309110"/>
+            <a:ext cx="4127500" cy="876300"/>
           </a:xfrm>
           <a:prstGeom prst="roundRect"/>
           <a:solidFill>
@@ -11876,142 +11822,16 @@
           </a:solidFill>
         </p:spPr>
       </p:pic>
-      <p:sp>
-        <p:nvSpPr>
-          <p:cNvPr id="67" name="텍스트 상자 24"/>
-          <p:cNvSpPr txBox="1">
-            <a:spLocks/>
-          </p:cNvSpPr>
-          <p:nvPr/>
-        </p:nvSpPr>
-        <p:spPr>
-          <a:xfrm rot="0">
-            <a:off x="6804025" y="4086860"/>
-            <a:ext cx="4154805" cy="2061845"/>
-          </a:xfrm>
-          <a:prstGeom prst="rect"/>
-          <a:noFill/>
-          <a:ln w="0">
-            <a:noFill/>
-            <a:prstDash/>
-          </a:ln>
-        </p:spPr>
-        <p:txBody>
-          <a:bodyPr wrap="square" lIns="89535" tIns="46355" rIns="89535" bIns="46355" numCol="1" vert="horz" anchor="t">
-            <a:spAutoFit/>
-          </a:bodyPr>
-          <a:lstStyle/>
-          <a:p>
-            <a:pPr marL="0" indent="0" rtl="0" algn="l" defTabSz="914400" eaLnBrk="1" latinLnBrk="0" hangingPunct="1">
-              <a:buFontTx/>
-              <a:buNone/>
-            </a:pPr>
-            <a:r>
-              <a:rPr lang="ko-KR" sz="2000" b="1">
-                <a:solidFill>
-                  <a:srgbClr val="0611F2"/>
-                </a:solidFill>
-                <a:latin typeface="맑은 고딕" charset="0"/>
-                <a:ea typeface="맑은 고딕" charset="0"/>
-              </a:rPr>
-              <a:t>37.</a:t>
-            </a:r>
-            <a:r>
-              <a:rPr lang="ko-KR" sz="2000">
-                <a:solidFill>
-                  <a:srgbClr val="0611F2"/>
-                </a:solidFill>
-                <a:latin typeface="맑은 고딕" charset="0"/>
-                <a:ea typeface="맑은 고딕" charset="0"/>
-              </a:rPr>
-              <a:t> </a:t>
-            </a:r>
-            <a:r>
-              <a:rPr lang="ko-KR" sz="1800">
-                <a:latin typeface="맑은 고딕" charset="0"/>
-                <a:ea typeface="맑은 고딕" charset="0"/>
-              </a:rPr>
-              <a:t>그</a:t>
-            </a:r>
-            <a:r>
-              <a:rPr lang="ko-KR" sz="1800">
-                <a:latin typeface="맑은 고딕" charset="0"/>
-                <a:ea typeface="맑은 고딕" charset="0"/>
-              </a:rPr>
-              <a:t>런 </a:t>
-            </a:r>
-            <a:r>
-              <a:rPr lang="ko-KR" sz="1800">
-                <a:latin typeface="맑은 고딕" charset="0"/>
-                <a:ea typeface="맑은 고딕" charset="0"/>
-              </a:rPr>
-              <a:t>다음</a:t>
-            </a:r>
-            <a:r>
-              <a:rPr lang="ko-KR" sz="1800">
-                <a:latin typeface="맑은 고딕" charset="0"/>
-                <a:ea typeface="맑은 고딕" charset="0"/>
-              </a:rPr>
-              <a:t> Login( ) 함수를 생성하고 로그인에 대한 정보를 입력받습니다.</a:t>
-            </a:r>
-            <a:endParaRPr lang="ko-KR" altLang="en-US" sz="1800">
-              <a:latin typeface="맑은 고딕" charset="0"/>
-              <a:ea typeface="맑은 고딕" charset="0"/>
-            </a:endParaRPr>
-          </a:p>
-          <a:p>
-            <a:pPr marL="0" indent="0" rtl="0" algn="l" defTabSz="914400" eaLnBrk="1" latinLnBrk="0" hangingPunct="1">
-              <a:buFontTx/>
-              <a:buNone/>
-            </a:pPr>
-            <a:endParaRPr lang="ko-KR" altLang="en-US" sz="1800">
-              <a:latin typeface="맑은 고딕" charset="0"/>
-              <a:ea typeface="맑은 고딕" charset="0"/>
-            </a:endParaRPr>
-          </a:p>
-          <a:p>
-            <a:pPr marL="0" indent="0" rtl="0" algn="l" defTabSz="914400" eaLnBrk="1" latinLnBrk="0" hangingPunct="1">
-              <a:buFontTx/>
-              <a:buNone/>
-            </a:pPr>
-            <a:r>
-              <a:rPr lang="ko-KR" sz="1800">
-                <a:latin typeface="맑은 고딕" charset="0"/>
-                <a:ea typeface="맑은 고딕" charset="0"/>
-              </a:rPr>
-              <a:t>그</a:t>
-            </a:r>
-            <a:r>
-              <a:rPr lang="ko-KR" sz="1800">
-                <a:latin typeface="맑은 고딕" charset="0"/>
-                <a:ea typeface="맑은 고딕" charset="0"/>
-              </a:rPr>
-              <a:t>다음으로</a:t>
-            </a:r>
-            <a:r>
-              <a:rPr lang="ko-KR" sz="1800">
-                <a:latin typeface="맑은 고딕" charset="0"/>
-                <a:ea typeface="맑은 고딕" charset="0"/>
-              </a:rPr>
-              <a:t> 로그인의 여부를 설정하는 LoginWithEmailAddress( ) 함수로 로그인 인증 절차를 확인합니다.</a:t>
-            </a:r>
-            <a:endParaRPr lang="ko-KR" altLang="en-US" sz="1800">
-              <a:latin typeface="맑은 고딕" charset="0"/>
-              <a:ea typeface="맑은 고딕" charset="0"/>
-            </a:endParaRPr>
-          </a:p>
-        </p:txBody>
-      </p:sp>
       <p:pic>
         <p:nvPicPr>
-          <p:cNvPr id="68" name="그림 26" descr="C:/Users/nwond/AppData/Roaming/PolarisOffice/ETemp/21888_20881416/fImage1005063238467.png"/>
+          <p:cNvPr id="70" name="그림 27" descr="C:/Users/nwond/AppData/Roaming/PolarisOffice/ETemp/19028_11857112/fImage743503019358.png"/>
           <p:cNvPicPr>
             <a:picLocks noChangeAspect="1"/>
           </p:cNvPicPr>
           <p:nvPr/>
         </p:nvPicPr>
         <p:blipFill rotWithShape="1">
-          <a:blip r:embed="rId7" cstate="print">
+          <a:blip r:embed="rId9" cstate="print">
             <a:extLst>
               <a:ext uri="{28A0092B-C50C-407E-A947-70E740481C1C}">
                 <a14:useLocalDpi xmlns:a14="http://schemas.microsoft.com/office/drawing/2010/main" val="0"/>
@@ -12024,8 +11844,8 @@
         </p:blipFill>
         <p:spPr>
           <a:xfrm rot="0">
-            <a:off x="6810375" y="1454785"/>
-            <a:ext cx="4142105" cy="2518410"/>
+            <a:off x="6801485" y="1520825"/>
+            <a:ext cx="4152900" cy="2538730"/>
           </a:xfrm>
           <a:prstGeom prst="roundRect"/>
           <a:solidFill>
@@ -12303,38 +12123,7 @@
       </p:sp>
       <p:pic>
         <p:nvPicPr>
-          <p:cNvPr id="70" name="그림 15" descr="C:/Users/nwond/AppData/Roaming/PolarisOffice/ETemp/21888_20881416/fImage1380253166334.png"/>
-          <p:cNvPicPr>
-            <a:picLocks noChangeAspect="1"/>
-          </p:cNvPicPr>
-          <p:nvPr/>
-        </p:nvPicPr>
-        <p:blipFill rotWithShape="1">
-          <a:blip r:embed="rId9" cstate="print">
-            <a:extLst>
-              <a:ext uri="{28A0092B-C50C-407E-A947-70E740481C1C}">
-                <a14:useLocalDpi xmlns:a14="http://schemas.microsoft.com/office/drawing/2010/main" val="0"/>
-              </a:ext>
-            </a:extLst>
-          </a:blip>
-          <a:stretch>
-            <a:fillRect/>
-          </a:stretch>
-        </p:blipFill>
-        <p:spPr>
-          <a:xfrm rot="0">
-            <a:off x="1231900" y="1449070"/>
-            <a:ext cx="4154170" cy="2509520"/>
-          </a:xfrm>
-          <a:prstGeom prst="roundRect"/>
-          <a:solidFill>
-            <a:srgbClr val="EDEDED"/>
-          </a:solidFill>
-        </p:spPr>
-      </p:pic>
-      <p:pic>
-        <p:nvPicPr>
-          <p:cNvPr id="71" name="그림 29" descr="C:/Users/nwond/AppData/Roaming/PolarisOffice/ETemp/21888_20881416/fImage5250358491.png"/>
+          <p:cNvPr id="71" name="그림 29"/>
           <p:cNvPicPr>
             <a:picLocks noChangeAspect="1"/>
           </p:cNvPicPr>
@@ -12603,7 +12392,7 @@
       </p:sp>
       <p:pic>
         <p:nvPicPr>
-          <p:cNvPr id="74" name="그림 32" descr="C:/Users/nwond/AppData/Roaming/PolarisOffice/ETemp/21888_20881416/fImage88134162391.png"/>
+          <p:cNvPr id="74" name="그림 32"/>
           <p:cNvPicPr>
             <a:picLocks noChangeAspect="1"/>
           </p:cNvPicPr>
@@ -12666,7 +12455,7 @@
       </p:cxnSp>
       <p:pic>
         <p:nvPicPr>
-          <p:cNvPr id="76" name="그림 34" descr="C:/Users/nwond/AppData/Roaming/PolarisOffice/ETemp/21888_20881416/fImage58464067421.png"/>
+          <p:cNvPr id="76" name="그림 34"/>
           <p:cNvPicPr>
             <a:picLocks noChangeAspect="1"/>
           </p:cNvPicPr>
@@ -12688,6 +12477,37 @@
           <a:xfrm rot="0">
             <a:off x="6822440" y="3858895"/>
             <a:ext cx="4135755" cy="1310005"/>
+          </a:xfrm>
+          <a:prstGeom prst="roundRect"/>
+          <a:solidFill>
+            <a:srgbClr val="EDEDED"/>
+          </a:solidFill>
+        </p:spPr>
+      </p:pic>
+      <p:pic>
+        <p:nvPicPr>
+          <p:cNvPr id="77" name="그림 31" descr="C:/Users/nwond/AppData/Roaming/PolarisOffice/ETemp/19028_11857112/fImage1105453036962.png"/>
+          <p:cNvPicPr>
+            <a:picLocks noChangeAspect="1"/>
+          </p:cNvPicPr>
+          <p:nvPr/>
+        </p:nvPicPr>
+        <p:blipFill rotWithShape="1">
+          <a:blip r:embed="rId13" cstate="print">
+            <a:extLst>
+              <a:ext uri="{28A0092B-C50C-407E-A947-70E740481C1C}">
+                <a14:useLocalDpi xmlns:a14="http://schemas.microsoft.com/office/drawing/2010/main" val="0"/>
+              </a:ext>
+            </a:extLst>
+          </a:blip>
+          <a:stretch>
+            <a:fillRect/>
+          </a:stretch>
+        </p:blipFill>
+        <p:spPr>
+          <a:xfrm rot="0">
+            <a:off x="1231265" y="1452245"/>
+            <a:ext cx="4149725" cy="2564130"/>
           </a:xfrm>
           <a:prstGeom prst="roundRect"/>
           <a:solidFill>
@@ -12944,7 +12764,7 @@
       </p:sp>
       <p:pic>
         <p:nvPicPr>
-          <p:cNvPr id="69" name="그림 50" descr="C:/Users/nwond/AppData/Roaming/PolarisOffice/ETemp/21888_20881416/fImage87493874464.png"/>
+          <p:cNvPr id="69" name="그림 50"/>
           <p:cNvPicPr>
             <a:picLocks noChangeAspect="1"/>
           </p:cNvPicPr>
@@ -12975,7 +12795,7 @@
       </p:pic>
       <p:pic>
         <p:nvPicPr>
-          <p:cNvPr id="70" name="그림 55" descr="C:/Users/nwond/AppData/Roaming/PolarisOffice/ETemp/21888_20881416/fImage115533885705.png"/>
+          <p:cNvPr id="70" name="그림 55"/>
           <p:cNvPicPr>
             <a:picLocks noChangeAspect="1"/>
           </p:cNvPicPr>
@@ -13136,7 +12956,7 @@
       </p:sp>
       <p:pic>
         <p:nvPicPr>
-          <p:cNvPr id="73" name="그림 60" descr="C:/Users/nwond/AppData/Roaming/PolarisOffice/ETemp/21888_20881416/fImage121763918145.png"/>
+          <p:cNvPr id="73" name="그림 60"/>
           <p:cNvPicPr>
             <a:picLocks noChangeAspect="1"/>
           </p:cNvPicPr>
@@ -13165,16 +12985,80 @@
           </a:solidFill>
         </p:spPr>
       </p:pic>
+      <p:sp>
+        <p:nvSpPr>
+          <p:cNvPr id="79" name="텍스트 상자 18"/>
+          <p:cNvSpPr txBox="1">
+            <a:spLocks/>
+          </p:cNvSpPr>
+          <p:nvPr/>
+        </p:nvSpPr>
+        <p:spPr>
+          <a:xfrm rot="0">
+            <a:off x="6828155" y="5359400"/>
+            <a:ext cx="4133850" cy="955040"/>
+          </a:xfrm>
+          <a:prstGeom prst="rect"/>
+          <a:noFill/>
+          <a:ln w="0">
+            <a:noFill/>
+            <a:prstDash/>
+          </a:ln>
+        </p:spPr>
+        <p:txBody>
+          <a:bodyPr wrap="square" lIns="89535" tIns="46355" rIns="89535" bIns="46355" numCol="1" vert="horz" anchor="t">
+            <a:spAutoFit/>
+          </a:bodyPr>
+          <a:lstStyle/>
+          <a:p>
+            <a:pPr marL="0" indent="0" rtl="0" algn="l" defTabSz="914400" eaLnBrk="1" latinLnBrk="0" hangingPunct="1">
+              <a:buFontTx/>
+              <a:buNone/>
+            </a:pPr>
+            <a:r>
+              <a:rPr lang="ko-KR" sz="2000" b="1">
+                <a:solidFill>
+                  <a:srgbClr val="0611F2"/>
+                </a:solidFill>
+                <a:latin typeface="맑은 고딕" charset="0"/>
+                <a:ea typeface="맑은 고딕" charset="0"/>
+              </a:rPr>
+              <a:t>31.</a:t>
+            </a:r>
+            <a:r>
+              <a:rPr lang="ko-KR" sz="2000">
+                <a:solidFill>
+                  <a:srgbClr val="0611F2"/>
+                </a:solidFill>
+                <a:latin typeface="맑은 고딕" charset="0"/>
+                <a:ea typeface="맑은 고딕" charset="0"/>
+              </a:rPr>
+              <a:t> </a:t>
+            </a:r>
+            <a:r>
+              <a:rPr lang="ko-KR" sz="1800">
+                <a:latin typeface="맑은 고딕" charset="0"/>
+                <a:ea typeface="맑은 고딕" charset="0"/>
+              </a:rPr>
+              <a:t>그다음으로 Email 오브젝트의 앵커를 지정하고 위치와 크기를 설정합니다.</a:t>
+            </a:r>
+            <a:endParaRPr lang="ko-KR" altLang="en-US" sz="1800">
+              <a:latin typeface="맑은 고딕" charset="0"/>
+              <a:ea typeface="맑은 고딕" charset="0"/>
+            </a:endParaRPr>
+          </a:p>
+        </p:txBody>
+      </p:sp>
       <p:pic>
         <p:nvPicPr>
-          <p:cNvPr id="75" name="그림 64" descr="C:/Users/nwond/AppData/Roaming/PolarisOffice/ETemp/21888_20881416/fImage120743933281.png"/>
+          <p:cNvPr id="80" name="그림 19" descr="C:/Users/nwond/AppData/Roaming/PolarisOffice/ETemp/19028_11857112/fImage117543619169.png"/>
           <p:cNvPicPr>
             <a:picLocks noChangeAspect="1"/>
           </p:cNvPicPr>
           <p:nvPr/>
         </p:nvPicPr>
         <p:blipFill rotWithShape="1">
-          <a:blip r:embed="rId17" cstate="hqprint">
+          <a:blip r:embed="rId22" cstate="hqprint">
             <a:extLst>
               <a:ext uri="{28A0092B-C50C-407E-A947-70E740481C1C}">
                 <a14:useLocalDpi xmlns:a14="http://schemas.microsoft.com/office/drawing/2010/main"/>
@@ -13187,271 +13071,8 @@
         </p:blipFill>
         <p:spPr>
           <a:xfrm rot="0">
-            <a:off x="8174990" y="1454785"/>
-            <a:ext cx="2791460" cy="1111885"/>
-          </a:xfrm>
-          <a:prstGeom prst="roundRect"/>
-          <a:solidFill>
-            <a:srgbClr val="EDEDED"/>
-          </a:solidFill>
-        </p:spPr>
-      </p:pic>
-      <p:pic>
-        <p:nvPicPr>
-          <p:cNvPr id="76" name="그림 67" descr="C:/Users/nwond/AppData/Roaming/PolarisOffice/ETemp/21888_20881416/fImage87493946827.png"/>
-          <p:cNvPicPr>
-            <a:picLocks noChangeAspect="1"/>
-          </p:cNvPicPr>
-          <p:nvPr/>
-        </p:nvPicPr>
-        <p:blipFill rotWithShape="1">
-          <a:blip r:embed="rId18" cstate="hqprint">
-            <a:extLst>
-              <a:ext uri="{28A0092B-C50C-407E-A947-70E740481C1C}">
-                <a14:useLocalDpi xmlns:a14="http://schemas.microsoft.com/office/drawing/2010/main"/>
-              </a:ext>
-            </a:extLst>
-          </a:blip>
-          <a:stretch>
-            <a:fillRect/>
-          </a:stretch>
-        </p:blipFill>
-        <p:spPr>
-          <a:xfrm rot="0">
-            <a:off x="6830695" y="1461135"/>
-            <a:ext cx="1247775" cy="1111885"/>
-          </a:xfrm>
-          <a:prstGeom prst="roundRect"/>
-          <a:solidFill>
-            <a:srgbClr val="EDEDED"/>
-          </a:solidFill>
-        </p:spPr>
-      </p:pic>
-      <p:cxnSp>
-        <p:nvCxnSpPr>
-          <p:cNvPr id="77" name="도형 70"/>
-          <p:cNvCxnSpPr/>
-          <p:nvPr/>
-        </p:nvCxnSpPr>
-        <p:spPr>
-          <a:xfrm rot="0" flipV="1">
-            <a:off x="8041640" y="2197735"/>
-            <a:ext cx="2826385" cy="103505"/>
-          </a:xfrm>
-          <a:prstGeom prst="straightConnector1"/>
-          <a:ln w="6350" cap="flat" cmpd="sng">
-            <a:prstDash/>
-            <a:tailEnd type="triangle" w="med" len="med"/>
-          </a:ln>
-        </p:spPr>
-        <p:style>
-          <a:lnRef idx="1">
-            <a:schemeClr val="accent1"/>
-          </a:lnRef>
-          <a:fillRef idx="0">
-            <a:schemeClr val="accent1"/>
-          </a:fillRef>
-          <a:effectRef idx="0">
-            <a:schemeClr val="accent1"/>
-          </a:effectRef>
-          <a:fontRef idx="minor">
-            <a:schemeClr val="tx1"/>
-          </a:fontRef>
-        </p:style>
-      </p:cxnSp>
-      <p:sp>
-        <p:nvSpPr>
-          <p:cNvPr id="78" name="텍스트 상자 71"/>
-          <p:cNvSpPr txBox="1">
-            <a:spLocks/>
-          </p:cNvSpPr>
-          <p:nvPr/>
-        </p:nvSpPr>
-        <p:spPr>
-          <a:xfrm rot="0">
-            <a:off x="6837045" y="2642870"/>
-            <a:ext cx="4121785" cy="954405"/>
-          </a:xfrm>
-          <a:prstGeom prst="rect"/>
-          <a:noFill/>
-          <a:ln w="0">
-            <a:noFill/>
-            <a:prstDash/>
-          </a:ln>
-        </p:spPr>
-        <p:txBody>
-          <a:bodyPr wrap="square" lIns="89535" tIns="46355" rIns="89535" bIns="46355" numCol="1" vert="horz" anchor="t">
-            <a:spAutoFit/>
-          </a:bodyPr>
-          <a:lstStyle/>
-          <a:p>
-            <a:pPr marL="0" indent="0" rtl="0" algn="l" defTabSz="914400" eaLnBrk="1" latinLnBrk="0" hangingPunct="1">
-              <a:buFontTx/>
-              <a:buNone/>
-            </a:pPr>
-            <a:r>
-              <a:rPr lang="ko-KR" sz="2000" b="1">
-                <a:solidFill>
-                  <a:srgbClr val="0611F2"/>
-                </a:solidFill>
-                <a:latin typeface="맑은 고딕" charset="0"/>
-                <a:ea typeface="맑은 고딕" charset="0"/>
-              </a:rPr>
-              <a:t>4</a:t>
-            </a:r>
-            <a:r>
-              <a:rPr lang="ko-KR" sz="2000" b="1">
-                <a:solidFill>
-                  <a:srgbClr val="0611F2"/>
-                </a:solidFill>
-                <a:latin typeface="맑은 고딕" charset="0"/>
-                <a:ea typeface="맑은 고딕" charset="0"/>
-              </a:rPr>
-              <a:t>3</a:t>
-            </a:r>
-            <a:r>
-              <a:rPr lang="ko-KR" sz="2000" b="1">
-                <a:solidFill>
-                  <a:srgbClr val="0611F2"/>
-                </a:solidFill>
-                <a:latin typeface="맑은 고딕" charset="0"/>
-                <a:ea typeface="맑은 고딕" charset="0"/>
-              </a:rPr>
-              <a:t>.</a:t>
-            </a:r>
-            <a:r>
-              <a:rPr lang="ko-KR" sz="2000">
-                <a:solidFill>
-                  <a:srgbClr val="0611F2"/>
-                </a:solidFill>
-                <a:latin typeface="맑은 고딕" charset="0"/>
-                <a:ea typeface="맑은 고딕" charset="0"/>
-              </a:rPr>
-              <a:t> </a:t>
-            </a:r>
-            <a:r>
-              <a:rPr lang="ko-KR" sz="1800">
-                <a:latin typeface="맑은 고딕" charset="0"/>
-                <a:ea typeface="맑은 고딕" charset="0"/>
-              </a:rPr>
-              <a:t>이제 </a:t>
-            </a:r>
-            <a:r>
-              <a:rPr lang="ko-KR" sz="1800">
-                <a:latin typeface="맑은 고딕" charset="0"/>
-                <a:ea typeface="맑은 고딕" charset="0"/>
-              </a:rPr>
-              <a:t>Photon Setting 스크립트에 있는 User ID 변수에 User Name Input 오브젝트를 넣어줍니다.</a:t>
-            </a:r>
-            <a:endParaRPr lang="ko-KR" altLang="en-US" sz="1800">
-              <a:latin typeface="맑은 고딕" charset="0"/>
-              <a:ea typeface="맑은 고딕" charset="0"/>
-            </a:endParaRPr>
-          </a:p>
-        </p:txBody>
-      </p:sp>
-      <p:sp>
-        <p:nvSpPr>
-          <p:cNvPr id="79" name="텍스트 상자 50"/>
-          <p:cNvSpPr txBox="1">
-            <a:spLocks/>
-          </p:cNvSpPr>
-          <p:nvPr/>
-        </p:nvSpPr>
-        <p:spPr>
-          <a:xfrm rot="0">
-            <a:off x="6837680" y="5316220"/>
-            <a:ext cx="4141470" cy="954405"/>
-          </a:xfrm>
-          <a:prstGeom prst="rect"/>
-          <a:noFill/>
-          <a:ln w="0">
-            <a:noFill/>
-            <a:prstDash/>
-          </a:ln>
-        </p:spPr>
-        <p:txBody>
-          <a:bodyPr wrap="square" lIns="89535" tIns="46355" rIns="89535" bIns="46355" numCol="1" vert="horz" anchor="t">
-            <a:spAutoFit/>
-          </a:bodyPr>
-          <a:lstStyle/>
-          <a:p>
-            <a:pPr marL="0" indent="0" rtl="0" algn="l" defTabSz="914400" eaLnBrk="1" latinLnBrk="0" hangingPunct="1">
-              <a:buFontTx/>
-              <a:buNone/>
-            </a:pPr>
-            <a:r>
-              <a:rPr lang="ko-KR" sz="2000" b="1">
-                <a:solidFill>
-                  <a:srgbClr val="0611F2"/>
-                </a:solidFill>
-                <a:latin typeface="맑은 고딕" charset="0"/>
-                <a:ea typeface="맑은 고딕" charset="0"/>
-              </a:rPr>
-              <a:t>44.</a:t>
-            </a:r>
-            <a:r>
-              <a:rPr lang="ko-KR" sz="2000">
-                <a:solidFill>
-                  <a:srgbClr val="0611F2"/>
-                </a:solidFill>
-                <a:latin typeface="맑은 고딕" charset="0"/>
-                <a:ea typeface="맑은 고딕" charset="0"/>
-              </a:rPr>
-              <a:t> </a:t>
-            </a:r>
-            <a:r>
-              <a:rPr lang="ko-KR" sz="1800">
-                <a:latin typeface="맑은 고딕" charset="0"/>
-                <a:ea typeface="맑은 고딕" charset="0"/>
-              </a:rPr>
-              <a:t>그</a:t>
-            </a:r>
-            <a:r>
-              <a:rPr lang="ko-KR" sz="1800">
-                <a:latin typeface="맑은 고딕" charset="0"/>
-                <a:ea typeface="맑은 고딕" charset="0"/>
-              </a:rPr>
-              <a:t>리고</a:t>
-            </a:r>
-            <a:r>
-              <a:rPr lang="ko-KR" sz="1800">
-                <a:latin typeface="맑은 고딕" charset="0"/>
-                <a:ea typeface="맑은 고딕" charset="0"/>
-              </a:rPr>
-              <a:t> UserName Input 오브젝트의 앵커를 지정하고 위치와 크기를 설정합니다.</a:t>
-            </a:r>
-            <a:endParaRPr lang="ko-KR" altLang="en-US" sz="1800">
-              <a:latin typeface="맑은 고딕" charset="0"/>
-              <a:ea typeface="맑은 고딕" charset="0"/>
-            </a:endParaRPr>
-          </a:p>
-        </p:txBody>
-      </p:sp>
-      <p:pic>
-        <p:nvPicPr>
-          <p:cNvPr id="80" name="그림 51" descr="C:/Users/nwond/AppData/Roaming/PolarisOffice/ETemp/21888_20881416/fImage122264054827.png"/>
-          <p:cNvPicPr>
-            <a:picLocks noChangeAspect="1"/>
-          </p:cNvPicPr>
-          <p:nvPr/>
-        </p:nvPicPr>
-        <p:blipFill rotWithShape="1">
-          <a:blip r:embed="rId21" cstate="hqprint">
-            <a:extLst>
-              <a:ext uri="{28A0092B-C50C-407E-A947-70E740481C1C}">
-                <a14:useLocalDpi xmlns:a14="http://schemas.microsoft.com/office/drawing/2010/main"/>
-              </a:ext>
-            </a:extLst>
-          </a:blip>
-          <a:stretch>
-            <a:fillRect/>
-          </a:stretch>
-        </p:blipFill>
-        <p:spPr>
-          <a:xfrm rot="0">
-            <a:off x="6835140" y="3682365"/>
-            <a:ext cx="4129405" cy="1564640"/>
+            <a:off x="6825615" y="3755390"/>
+            <a:ext cx="4133850" cy="1532890"/>
           </a:xfrm>
           <a:prstGeom prst="roundRect"/>
           <a:solidFill>

</xml_diff>